<commit_message>
added 1st 2 panels of poster
</commit_message>
<xml_diff>
--- a/documents/poster/poster.pptx
+++ b/documents/poster/poster.pptx
@@ -109,921 +109,35 @@
 
 <file path=ppt/charts/chart1.xml><?xml version="1.0" encoding="utf-8"?>
 <c:chartSpace xmlns:c="http://schemas.openxmlformats.org/drawingml/2006/chart" xmlns:a="http://schemas.openxmlformats.org/drawingml/2006/main" xmlns:r="http://schemas.openxmlformats.org/officeDocument/2006/relationships">
+  <c:date1904 val="0"/>
   <c:lang val="en-US"/>
+  <c:roundedCorners val="0"/>
+  <mc:AlternateContent xmlns:mc="http://schemas.openxmlformats.org/markup-compatibility/2006">
+    <mc:Choice xmlns:c14="http://schemas.microsoft.com/office/drawing/2007/8/2/chart" Requires="c14">
+      <c14:style val="102"/>
+    </mc:Choice>
+    <mc:Fallback>
+      <c:style val="2"/>
+    </mc:Fallback>
+  </mc:AlternateContent>
   <c:chart>
-    <c:plotArea>
-      <c:layout/>
-      <c:barChart>
-        <c:barDir val="col"/>
-        <c:grouping val="percentStacked"/>
-        <c:ser>
-          <c:idx val="0"/>
-          <c:order val="0"/>
-          <c:tx>
-            <c:strRef>
-              <c:f>'Sheet2 (2)'!$B$2053</c:f>
-              <c:strCache>
-                <c:ptCount val="1"/>
-                <c:pt idx="0">
-                  <c:v>0-7</c:v>
-                </c:pt>
-              </c:strCache>
-            </c:strRef>
-          </c:tx>
-          <c:cat>
-            <c:strRef>
-              <c:f>'Sheet2 (2)'!$A$2055:$A$2063</c:f>
-              <c:strCache>
-                <c:ptCount val="9"/>
-                <c:pt idx="0">
-                  <c:v>mcf</c:v>
-                </c:pt>
-                <c:pt idx="1">
-                  <c:v>lbm</c:v>
-                </c:pt>
-                <c:pt idx="2">
-                  <c:v>astar</c:v>
-                </c:pt>
-                <c:pt idx="3">
-                  <c:v>tpch2</c:v>
-                </c:pt>
-                <c:pt idx="4">
-                  <c:v>calculix</c:v>
-                </c:pt>
-                <c:pt idx="5">
-                  <c:v>h264ref</c:v>
-                </c:pt>
-                <c:pt idx="6">
-                  <c:v>wrf</c:v>
-                </c:pt>
-                <c:pt idx="7">
-                  <c:v>povray</c:v>
-                </c:pt>
-                <c:pt idx="8">
-                  <c:v>gcc</c:v>
-                </c:pt>
-              </c:strCache>
-            </c:strRef>
-          </c:cat>
-          <c:val>
-            <c:numRef>
-              <c:f>'Sheet2 (2)'!$B$2055:$B$2063</c:f>
-              <c:numCache>
-                <c:formatCode>General</c:formatCode>
-                <c:ptCount val="9"/>
-                <c:pt idx="0">
-                  <c:v>95747</c:v>
-                </c:pt>
-                <c:pt idx="1">
-                  <c:v>74979</c:v>
-                </c:pt>
-                <c:pt idx="2">
-                  <c:v>2102620</c:v>
-                </c:pt>
-                <c:pt idx="3">
-                  <c:v>375881841</c:v>
-                </c:pt>
-                <c:pt idx="4">
-                  <c:v>50813</c:v>
-                </c:pt>
-                <c:pt idx="5">
-                  <c:v>2233065</c:v>
-                </c:pt>
-                <c:pt idx="6">
-                  <c:v>12892190</c:v>
-                </c:pt>
-                <c:pt idx="7">
-                  <c:v>1907038</c:v>
-                </c:pt>
-                <c:pt idx="8">
-                  <c:v>5443123</c:v>
-                </c:pt>
-              </c:numCache>
-            </c:numRef>
-          </c:val>
-        </c:ser>
-        <c:ser>
-          <c:idx val="1"/>
-          <c:order val="1"/>
-          <c:tx>
-            <c:strRef>
-              <c:f>'Sheet2 (2)'!$C$2053</c:f>
-              <c:strCache>
-                <c:ptCount val="1"/>
-                <c:pt idx="0">
-                  <c:v>8-15</c:v>
-                </c:pt>
-              </c:strCache>
-            </c:strRef>
-          </c:tx>
-          <c:cat>
-            <c:strRef>
-              <c:f>'Sheet2 (2)'!$A$2055:$A$2063</c:f>
-              <c:strCache>
-                <c:ptCount val="9"/>
-                <c:pt idx="0">
-                  <c:v>mcf</c:v>
-                </c:pt>
-                <c:pt idx="1">
-                  <c:v>lbm</c:v>
-                </c:pt>
-                <c:pt idx="2">
-                  <c:v>astar</c:v>
-                </c:pt>
-                <c:pt idx="3">
-                  <c:v>tpch2</c:v>
-                </c:pt>
-                <c:pt idx="4">
-                  <c:v>calculix</c:v>
-                </c:pt>
-                <c:pt idx="5">
-                  <c:v>h264ref</c:v>
-                </c:pt>
-                <c:pt idx="6">
-                  <c:v>wrf</c:v>
-                </c:pt>
-                <c:pt idx="7">
-                  <c:v>povray</c:v>
-                </c:pt>
-                <c:pt idx="8">
-                  <c:v>gcc</c:v>
-                </c:pt>
-              </c:strCache>
-            </c:strRef>
-          </c:cat>
-          <c:val>
-            <c:numRef>
-              <c:f>'Sheet2 (2)'!$C$2055:$C$2063</c:f>
-              <c:numCache>
-                <c:formatCode>General</c:formatCode>
-                <c:ptCount val="9"/>
-                <c:pt idx="0">
-                  <c:v>591</c:v>
-                </c:pt>
-                <c:pt idx="1">
-                  <c:v>12817602</c:v>
-                </c:pt>
-                <c:pt idx="2">
-                  <c:v>1006006</c:v>
-                </c:pt>
-                <c:pt idx="3">
-                  <c:v>419865</c:v>
-                </c:pt>
-                <c:pt idx="4">
-                  <c:v>5819</c:v>
-                </c:pt>
-                <c:pt idx="5">
-                  <c:v>2888878</c:v>
-                </c:pt>
-                <c:pt idx="6">
-                  <c:v>994569</c:v>
-                </c:pt>
-                <c:pt idx="7">
-                  <c:v>745306</c:v>
-                </c:pt>
-                <c:pt idx="8">
-                  <c:v>329320</c:v>
-                </c:pt>
-              </c:numCache>
-            </c:numRef>
-          </c:val>
-        </c:ser>
-        <c:ser>
-          <c:idx val="2"/>
-          <c:order val="2"/>
-          <c:tx>
-            <c:strRef>
-              <c:f>'Sheet2 (2)'!$D$2053</c:f>
-              <c:strCache>
-                <c:ptCount val="1"/>
-                <c:pt idx="0">
-                  <c:v>16-23</c:v>
-                </c:pt>
-              </c:strCache>
-            </c:strRef>
-          </c:tx>
-          <c:cat>
-            <c:strRef>
-              <c:f>'Sheet2 (2)'!$A$2055:$A$2063</c:f>
-              <c:strCache>
-                <c:ptCount val="9"/>
-                <c:pt idx="0">
-                  <c:v>mcf</c:v>
-                </c:pt>
-                <c:pt idx="1">
-                  <c:v>lbm</c:v>
-                </c:pt>
-                <c:pt idx="2">
-                  <c:v>astar</c:v>
-                </c:pt>
-                <c:pt idx="3">
-                  <c:v>tpch2</c:v>
-                </c:pt>
-                <c:pt idx="4">
-                  <c:v>calculix</c:v>
-                </c:pt>
-                <c:pt idx="5">
-                  <c:v>h264ref</c:v>
-                </c:pt>
-                <c:pt idx="6">
-                  <c:v>wrf</c:v>
-                </c:pt>
-                <c:pt idx="7">
-                  <c:v>povray</c:v>
-                </c:pt>
-                <c:pt idx="8">
-                  <c:v>gcc</c:v>
-                </c:pt>
-              </c:strCache>
-            </c:strRef>
-          </c:cat>
-          <c:val>
-            <c:numRef>
-              <c:f>'Sheet2 (2)'!$D$2055:$D$2063</c:f>
-              <c:numCache>
-                <c:formatCode>General</c:formatCode>
-                <c:ptCount val="9"/>
-                <c:pt idx="0">
-                  <c:v>1286278</c:v>
-                </c:pt>
-                <c:pt idx="1">
-                  <c:v>879730</c:v>
-                </c:pt>
-                <c:pt idx="2">
-                  <c:v>16461026</c:v>
-                </c:pt>
-                <c:pt idx="3">
-                  <c:v>14614264</c:v>
-                </c:pt>
-                <c:pt idx="4">
-                  <c:v>119491</c:v>
-                </c:pt>
-                <c:pt idx="5">
-                  <c:v>11576435</c:v>
-                </c:pt>
-                <c:pt idx="6">
-                  <c:v>317339</c:v>
-                </c:pt>
-                <c:pt idx="7">
-                  <c:v>5062854</c:v>
-                </c:pt>
-                <c:pt idx="8">
-                  <c:v>15140710</c:v>
-                </c:pt>
-              </c:numCache>
-            </c:numRef>
-          </c:val>
-        </c:ser>
-        <c:ser>
-          <c:idx val="3"/>
-          <c:order val="3"/>
-          <c:tx>
-            <c:strRef>
-              <c:f>'Sheet2 (2)'!$E$2053</c:f>
-              <c:strCache>
-                <c:ptCount val="1"/>
-                <c:pt idx="0">
-                  <c:v>24-31</c:v>
-                </c:pt>
-              </c:strCache>
-            </c:strRef>
-          </c:tx>
-          <c:cat>
-            <c:strRef>
-              <c:f>'Sheet2 (2)'!$A$2055:$A$2063</c:f>
-              <c:strCache>
-                <c:ptCount val="9"/>
-                <c:pt idx="0">
-                  <c:v>mcf</c:v>
-                </c:pt>
-                <c:pt idx="1">
-                  <c:v>lbm</c:v>
-                </c:pt>
-                <c:pt idx="2">
-                  <c:v>astar</c:v>
-                </c:pt>
-                <c:pt idx="3">
-                  <c:v>tpch2</c:v>
-                </c:pt>
-                <c:pt idx="4">
-                  <c:v>calculix</c:v>
-                </c:pt>
-                <c:pt idx="5">
-                  <c:v>h264ref</c:v>
-                </c:pt>
-                <c:pt idx="6">
-                  <c:v>wrf</c:v>
-                </c:pt>
-                <c:pt idx="7">
-                  <c:v>povray</c:v>
-                </c:pt>
-                <c:pt idx="8">
-                  <c:v>gcc</c:v>
-                </c:pt>
-              </c:strCache>
-            </c:strRef>
-          </c:cat>
-          <c:val>
-            <c:numRef>
-              <c:f>'Sheet2 (2)'!$E$2055:$E$2063</c:f>
-              <c:numCache>
-                <c:formatCode>General</c:formatCode>
-                <c:ptCount val="9"/>
-                <c:pt idx="0">
-                  <c:v>101237209</c:v>
-                </c:pt>
-                <c:pt idx="1">
-                  <c:v>1202307</c:v>
-                </c:pt>
-                <c:pt idx="2">
-                  <c:v>169424087</c:v>
-                </c:pt>
-                <c:pt idx="3">
-                  <c:v>34810743</c:v>
-                </c:pt>
-                <c:pt idx="4">
-                  <c:v>84860</c:v>
-                </c:pt>
-                <c:pt idx="5">
-                  <c:v>1509034</c:v>
-                </c:pt>
-                <c:pt idx="6">
-                  <c:v>309028</c:v>
-                </c:pt>
-                <c:pt idx="7">
-                  <c:v>3195618</c:v>
-                </c:pt>
-                <c:pt idx="8">
-                  <c:v>86700988</c:v>
-                </c:pt>
-              </c:numCache>
-            </c:numRef>
-          </c:val>
-        </c:ser>
-        <c:ser>
-          <c:idx val="4"/>
-          <c:order val="4"/>
-          <c:tx>
-            <c:strRef>
-              <c:f>'Sheet2 (2)'!$F$2053</c:f>
-              <c:strCache>
-                <c:ptCount val="1"/>
-                <c:pt idx="0">
-                  <c:v>32-39</c:v>
-                </c:pt>
-              </c:strCache>
-            </c:strRef>
-          </c:tx>
-          <c:cat>
-            <c:strRef>
-              <c:f>'Sheet2 (2)'!$A$2055:$A$2063</c:f>
-              <c:strCache>
-                <c:ptCount val="9"/>
-                <c:pt idx="0">
-                  <c:v>mcf</c:v>
-                </c:pt>
-                <c:pt idx="1">
-                  <c:v>lbm</c:v>
-                </c:pt>
-                <c:pt idx="2">
-                  <c:v>astar</c:v>
-                </c:pt>
-                <c:pt idx="3">
-                  <c:v>tpch2</c:v>
-                </c:pt>
-                <c:pt idx="4">
-                  <c:v>calculix</c:v>
-                </c:pt>
-                <c:pt idx="5">
-                  <c:v>h264ref</c:v>
-                </c:pt>
-                <c:pt idx="6">
-                  <c:v>wrf</c:v>
-                </c:pt>
-                <c:pt idx="7">
-                  <c:v>povray</c:v>
-                </c:pt>
-                <c:pt idx="8">
-                  <c:v>gcc</c:v>
-                </c:pt>
-              </c:strCache>
-            </c:strRef>
-          </c:cat>
-          <c:val>
-            <c:numRef>
-              <c:f>'Sheet2 (2)'!$F$2055:$F$2063</c:f>
-              <c:numCache>
-                <c:formatCode>General</c:formatCode>
-                <c:ptCount val="9"/>
-                <c:pt idx="0">
-                  <c:v>438661822</c:v>
-                </c:pt>
-                <c:pt idx="1">
-                  <c:v>793833</c:v>
-                </c:pt>
-                <c:pt idx="2">
-                  <c:v>670753253</c:v>
-                </c:pt>
-                <c:pt idx="3">
-                  <c:v>50533937</c:v>
-                </c:pt>
-                <c:pt idx="4">
-                  <c:v>194054</c:v>
-                </c:pt>
-                <c:pt idx="5">
-                  <c:v>97922655</c:v>
-                </c:pt>
-                <c:pt idx="6">
-                  <c:v>518059</c:v>
-                </c:pt>
-                <c:pt idx="7">
-                  <c:v>6346086</c:v>
-                </c:pt>
-                <c:pt idx="8">
-                  <c:v>60228812</c:v>
-                </c:pt>
-              </c:numCache>
-            </c:numRef>
-          </c:val>
-        </c:ser>
-        <c:ser>
-          <c:idx val="5"/>
-          <c:order val="5"/>
-          <c:tx>
-            <c:strRef>
-              <c:f>'Sheet2 (2)'!$G$2053</c:f>
-              <c:strCache>
-                <c:ptCount val="1"/>
-                <c:pt idx="0">
-                  <c:v>40-47</c:v>
-                </c:pt>
-              </c:strCache>
-            </c:strRef>
-          </c:tx>
-          <c:cat>
-            <c:strRef>
-              <c:f>'Sheet2 (2)'!$A$2055:$A$2063</c:f>
-              <c:strCache>
-                <c:ptCount val="9"/>
-                <c:pt idx="0">
-                  <c:v>mcf</c:v>
-                </c:pt>
-                <c:pt idx="1">
-                  <c:v>lbm</c:v>
-                </c:pt>
-                <c:pt idx="2">
-                  <c:v>astar</c:v>
-                </c:pt>
-                <c:pt idx="3">
-                  <c:v>tpch2</c:v>
-                </c:pt>
-                <c:pt idx="4">
-                  <c:v>calculix</c:v>
-                </c:pt>
-                <c:pt idx="5">
-                  <c:v>h264ref</c:v>
-                </c:pt>
-                <c:pt idx="6">
-                  <c:v>wrf</c:v>
-                </c:pt>
-                <c:pt idx="7">
-                  <c:v>povray</c:v>
-                </c:pt>
-                <c:pt idx="8">
-                  <c:v>gcc</c:v>
-                </c:pt>
-              </c:strCache>
-            </c:strRef>
-          </c:cat>
-          <c:val>
-            <c:numRef>
-              <c:f>'Sheet2 (2)'!$G$2055:$G$2063</c:f>
-              <c:numCache>
-                <c:formatCode>General</c:formatCode>
-                <c:ptCount val="9"/>
-                <c:pt idx="0">
-                  <c:v>1596238818</c:v>
-                </c:pt>
-                <c:pt idx="1">
-                  <c:v>828881</c:v>
-                </c:pt>
-                <c:pt idx="2">
-                  <c:v>281444015</c:v>
-                </c:pt>
-                <c:pt idx="3">
-                  <c:v>72471798</c:v>
-                </c:pt>
-                <c:pt idx="4">
-                  <c:v>191533</c:v>
-                </c:pt>
-                <c:pt idx="5">
-                  <c:v>2363534</c:v>
-                </c:pt>
-                <c:pt idx="6">
-                  <c:v>690912</c:v>
-                </c:pt>
-                <c:pt idx="7">
-                  <c:v>15479836</c:v>
-                </c:pt>
-                <c:pt idx="8">
-                  <c:v>62365042</c:v>
-                </c:pt>
-              </c:numCache>
-            </c:numRef>
-          </c:val>
-        </c:ser>
-        <c:ser>
-          <c:idx val="6"/>
-          <c:order val="6"/>
-          <c:tx>
-            <c:strRef>
-              <c:f>'Sheet2 (2)'!$H$2053</c:f>
-              <c:strCache>
-                <c:ptCount val="1"/>
-                <c:pt idx="0">
-                  <c:v>48-55</c:v>
-                </c:pt>
-              </c:strCache>
-            </c:strRef>
-          </c:tx>
-          <c:cat>
-            <c:strRef>
-              <c:f>'Sheet2 (2)'!$A$2055:$A$2063</c:f>
-              <c:strCache>
-                <c:ptCount val="9"/>
-                <c:pt idx="0">
-                  <c:v>mcf</c:v>
-                </c:pt>
-                <c:pt idx="1">
-                  <c:v>lbm</c:v>
-                </c:pt>
-                <c:pt idx="2">
-                  <c:v>astar</c:v>
-                </c:pt>
-                <c:pt idx="3">
-                  <c:v>tpch2</c:v>
-                </c:pt>
-                <c:pt idx="4">
-                  <c:v>calculix</c:v>
-                </c:pt>
-                <c:pt idx="5">
-                  <c:v>h264ref</c:v>
-                </c:pt>
-                <c:pt idx="6">
-                  <c:v>wrf</c:v>
-                </c:pt>
-                <c:pt idx="7">
-                  <c:v>povray</c:v>
-                </c:pt>
-                <c:pt idx="8">
-                  <c:v>gcc</c:v>
-                </c:pt>
-              </c:strCache>
-            </c:strRef>
-          </c:cat>
-          <c:val>
-            <c:numRef>
-              <c:f>'Sheet2 (2)'!$H$2055:$H$2063</c:f>
-              <c:numCache>
-                <c:formatCode>General</c:formatCode>
-                <c:ptCount val="9"/>
-                <c:pt idx="0">
-                  <c:v>204885178</c:v>
-                </c:pt>
-                <c:pt idx="1">
-                  <c:v>938329</c:v>
-                </c:pt>
-                <c:pt idx="2">
-                  <c:v>115110431</c:v>
-                </c:pt>
-                <c:pt idx="3">
-                  <c:v>47355960</c:v>
-                </c:pt>
-                <c:pt idx="4">
-                  <c:v>79283</c:v>
-                </c:pt>
-                <c:pt idx="5">
-                  <c:v>980554</c:v>
-                </c:pt>
-                <c:pt idx="6">
-                  <c:v>280055</c:v>
-                </c:pt>
-                <c:pt idx="7">
-                  <c:v>4372842</c:v>
-                </c:pt>
-                <c:pt idx="8">
-                  <c:v>2603173</c:v>
-                </c:pt>
-              </c:numCache>
-            </c:numRef>
-          </c:val>
-        </c:ser>
-        <c:ser>
-          <c:idx val="7"/>
-          <c:order val="7"/>
-          <c:tx>
-            <c:strRef>
-              <c:f>'Sheet2 (2)'!$I$2053</c:f>
-              <c:strCache>
-                <c:ptCount val="1"/>
-                <c:pt idx="0">
-                  <c:v>56-63</c:v>
-                </c:pt>
-              </c:strCache>
-            </c:strRef>
-          </c:tx>
-          <c:cat>
-            <c:strRef>
-              <c:f>'Sheet2 (2)'!$A$2055:$A$2063</c:f>
-              <c:strCache>
-                <c:ptCount val="9"/>
-                <c:pt idx="0">
-                  <c:v>mcf</c:v>
-                </c:pt>
-                <c:pt idx="1">
-                  <c:v>lbm</c:v>
-                </c:pt>
-                <c:pt idx="2">
-                  <c:v>astar</c:v>
-                </c:pt>
-                <c:pt idx="3">
-                  <c:v>tpch2</c:v>
-                </c:pt>
-                <c:pt idx="4">
-                  <c:v>calculix</c:v>
-                </c:pt>
-                <c:pt idx="5">
-                  <c:v>h264ref</c:v>
-                </c:pt>
-                <c:pt idx="6">
-                  <c:v>wrf</c:v>
-                </c:pt>
-                <c:pt idx="7">
-                  <c:v>povray</c:v>
-                </c:pt>
-                <c:pt idx="8">
-                  <c:v>gcc</c:v>
-                </c:pt>
-              </c:strCache>
-            </c:strRef>
-          </c:cat>
-          <c:val>
-            <c:numRef>
-              <c:f>'Sheet2 (2)'!$I$2055:$I$2063</c:f>
-              <c:numCache>
-                <c:formatCode>General</c:formatCode>
-                <c:ptCount val="9"/>
-                <c:pt idx="0">
-                  <c:v>1420617</c:v>
-                </c:pt>
-                <c:pt idx="1">
-                  <c:v>424299303</c:v>
-                </c:pt>
-                <c:pt idx="2">
-                  <c:v>88826182</c:v>
-                </c:pt>
-                <c:pt idx="3">
-                  <c:v>306096812</c:v>
-                </c:pt>
-                <c:pt idx="4">
-                  <c:v>49032</c:v>
-                </c:pt>
-                <c:pt idx="5">
-                  <c:v>313687</c:v>
-                </c:pt>
-                <c:pt idx="6">
-                  <c:v>122215</c:v>
-                </c:pt>
-                <c:pt idx="7">
-                  <c:v>1319390</c:v>
-                </c:pt>
-                <c:pt idx="8">
-                  <c:v>563222</c:v>
-                </c:pt>
-              </c:numCache>
-            </c:numRef>
-          </c:val>
-        </c:ser>
-        <c:ser>
-          <c:idx val="8"/>
-          <c:order val="8"/>
-          <c:tx>
-            <c:strRef>
-              <c:f>'Sheet2 (2)'!$J$2053</c:f>
-              <c:strCache>
-                <c:ptCount val="1"/>
-                <c:pt idx="0">
-                  <c:v>64</c:v>
-                </c:pt>
-              </c:strCache>
-            </c:strRef>
-          </c:tx>
-          <c:cat>
-            <c:strRef>
-              <c:f>'Sheet2 (2)'!$A$2055:$A$2063</c:f>
-              <c:strCache>
-                <c:ptCount val="9"/>
-                <c:pt idx="0">
-                  <c:v>mcf</c:v>
-                </c:pt>
-                <c:pt idx="1">
-                  <c:v>lbm</c:v>
-                </c:pt>
-                <c:pt idx="2">
-                  <c:v>astar</c:v>
-                </c:pt>
-                <c:pt idx="3">
-                  <c:v>tpch2</c:v>
-                </c:pt>
-                <c:pt idx="4">
-                  <c:v>calculix</c:v>
-                </c:pt>
-                <c:pt idx="5">
-                  <c:v>h264ref</c:v>
-                </c:pt>
-                <c:pt idx="6">
-                  <c:v>wrf</c:v>
-                </c:pt>
-                <c:pt idx="7">
-                  <c:v>povray</c:v>
-                </c:pt>
-                <c:pt idx="8">
-                  <c:v>gcc</c:v>
-                </c:pt>
-              </c:strCache>
-            </c:strRef>
-          </c:cat>
-          <c:val>
-            <c:numRef>
-              <c:f>'Sheet2 (2)'!$J$2055:$J$2063</c:f>
-              <c:numCache>
-                <c:formatCode>General</c:formatCode>
-                <c:ptCount val="9"/>
-                <c:pt idx="0">
-                  <c:v>1823662</c:v>
-                </c:pt>
-                <c:pt idx="1">
-                  <c:v>767029723</c:v>
-                </c:pt>
-                <c:pt idx="2">
-                  <c:v>36844724</c:v>
-                </c:pt>
-                <c:pt idx="3">
-                  <c:v>146813883</c:v>
-                </c:pt>
-                <c:pt idx="4">
-                  <c:v>445961</c:v>
-                </c:pt>
-                <c:pt idx="5">
-                  <c:v>3449636</c:v>
-                </c:pt>
-                <c:pt idx="6">
-                  <c:v>1840041</c:v>
-                </c:pt>
-                <c:pt idx="7">
-                  <c:v>8348369</c:v>
-                </c:pt>
-                <c:pt idx="8">
-                  <c:v>2601386</c:v>
-                </c:pt>
-              </c:numCache>
-            </c:numRef>
-          </c:val>
-        </c:ser>
-        <c:overlap val="100"/>
-        <c:axId val="134147072"/>
-        <c:axId val="134827392"/>
-      </c:barChart>
-      <c:catAx>
-        <c:axId val="134147072"/>
-        <c:scaling>
-          <c:orientation val="minMax"/>
-        </c:scaling>
-        <c:axPos val="b"/>
-        <c:title>
-          <c:tx>
-            <c:rich>
-              <a:bodyPr/>
-              <a:lstStyle/>
-              <a:p>
-                <a:pPr>
-                  <a:defRPr sz="3200"/>
-                </a:pPr>
-                <a:r>
-                  <a:rPr lang="en-US" sz="3200"/>
-                  <a:t>Benchmark</a:t>
-                </a:r>
-              </a:p>
-            </c:rich>
-          </c:tx>
-          <c:layout/>
-        </c:title>
-        <c:tickLblPos val="nextTo"/>
-        <c:txPr>
-          <a:bodyPr/>
-          <a:lstStyle/>
-          <a:p>
-            <a:pPr>
-              <a:defRPr sz="2000"/>
-            </a:pPr>
-            <a:endParaRPr lang="en-US"/>
-          </a:p>
-        </c:txPr>
-        <c:crossAx val="134827392"/>
-        <c:crosses val="autoZero"/>
-        <c:auto val="1"/>
-        <c:lblAlgn val="ctr"/>
-        <c:lblOffset val="100"/>
-      </c:catAx>
-      <c:valAx>
-        <c:axId val="134827392"/>
-        <c:scaling>
-          <c:orientation val="minMax"/>
-        </c:scaling>
-        <c:axPos val="l"/>
-        <c:title>
-          <c:tx>
-            <c:rich>
-              <a:bodyPr rot="-5400000" vert="horz"/>
-              <a:lstStyle/>
-              <a:p>
-                <a:pPr>
-                  <a:defRPr sz="2000" b="1"/>
-                </a:pPr>
-                <a:r>
-                  <a:rPr lang="en-US" sz="2000" b="1" dirty="0"/>
-                  <a:t>Percentage of Cache Blocks in Set</a:t>
-                </a:r>
-              </a:p>
-            </c:rich>
-          </c:tx>
-          <c:layout/>
-        </c:title>
-        <c:numFmt formatCode="0%" sourceLinked="1"/>
-        <c:tickLblPos val="nextTo"/>
-        <c:txPr>
-          <a:bodyPr/>
-          <a:lstStyle/>
-          <a:p>
-            <a:pPr>
-              <a:defRPr sz="2000"/>
-            </a:pPr>
-            <a:endParaRPr lang="en-US"/>
-          </a:p>
-        </c:txPr>
-        <c:crossAx val="134147072"/>
-        <c:crosses val="autoZero"/>
-        <c:crossBetween val="between"/>
-      </c:valAx>
-    </c:plotArea>
-    <c:legend>
-      <c:legendPos val="r"/>
-      <c:layout>
-        <c:manualLayout>
-          <c:xMode val="edge"/>
-          <c:yMode val="edge"/>
-          <c:x val="0.78753791192767575"/>
-          <c:y val="6.2691631742866238E-2"/>
-          <c:w val="0.2038361038203558"/>
-          <c:h val="0.6833540640246446"/>
-        </c:manualLayout>
-      </c:layout>
-      <c:txPr>
-        <a:bodyPr/>
-        <a:lstStyle/>
-        <a:p>
-          <a:pPr>
-            <a:defRPr sz="2000"/>
-          </a:pPr>
-          <a:endParaRPr lang="en-US"/>
-        </a:p>
-      </c:txPr>
-    </c:legend>
-    <c:plotVisOnly val="1"/>
-  </c:chart>
-  <c:externalData r:id="rId1"/>
-</c:chartSpace>
-</file>
-
-<file path=ppt/charts/chart2.xml><?xml version="1.0" encoding="utf-8"?>
-<c:chartSpace xmlns:c="http://schemas.openxmlformats.org/drawingml/2006/chart" xmlns:a="http://schemas.openxmlformats.org/drawingml/2006/main" xmlns:r="http://schemas.openxmlformats.org/officeDocument/2006/relationships">
-  <c:lang val="en-US"/>
-  <c:chart>
+    <c:autoTitleDeleted val="0"/>
     <c:plotArea>
       <c:layout>
         <c:manualLayout>
           <c:layoutTarget val="inner"/>
           <c:xMode val="edge"/>
           <c:yMode val="edge"/>
-          <c:x val="8.3966193813199766E-2"/>
-          <c:y val="3.4426417628029088E-2"/>
-          <c:w val="0.90340475122338593"/>
-          <c:h val="0.71114311368973682"/>
+          <c:x val="0.0839661938131998"/>
+          <c:y val="0.0344264176280291"/>
+          <c:w val="0.903404751223386"/>
+          <c:h val="0.711143113689737"/>
         </c:manualLayout>
       </c:layout>
       <c:barChart>
         <c:barDir val="col"/>
         <c:grouping val="clustered"/>
+        <c:varyColors val="0"/>
         <c:ser>
           <c:idx val="0"/>
           <c:order val="0"/>
@@ -1038,6 +152,7 @@
               </c:strCache>
             </c:strRef>
           </c:tx>
+          <c:invertIfNegative val="0"/>
           <c:cat>
             <c:strRef>
               <c:f>Sheet2!$B$2:$B$26</c:f>
@@ -1128,79 +243,79 @@
                 <c:formatCode>General</c:formatCode>
                 <c:ptCount val="25"/>
                 <c:pt idx="0">
-                  <c:v>1</c:v>
+                  <c:v>1.0</c:v>
                 </c:pt>
                 <c:pt idx="1">
-                  <c:v>1</c:v>
+                  <c:v>1.0</c:v>
                 </c:pt>
                 <c:pt idx="2">
-                  <c:v>1</c:v>
+                  <c:v>1.0</c:v>
                 </c:pt>
                 <c:pt idx="3">
-                  <c:v>1</c:v>
+                  <c:v>1.0</c:v>
                 </c:pt>
                 <c:pt idx="4">
-                  <c:v>1</c:v>
+                  <c:v>1.0</c:v>
                 </c:pt>
                 <c:pt idx="5">
-                  <c:v>1</c:v>
+                  <c:v>1.0</c:v>
                 </c:pt>
                 <c:pt idx="6">
-                  <c:v>1</c:v>
+                  <c:v>1.0</c:v>
                 </c:pt>
                 <c:pt idx="7">
-                  <c:v>1</c:v>
+                  <c:v>1.0</c:v>
                 </c:pt>
                 <c:pt idx="8">
-                  <c:v>1</c:v>
+                  <c:v>1.0</c:v>
                 </c:pt>
                 <c:pt idx="9">
-                  <c:v>1</c:v>
+                  <c:v>1.0</c:v>
                 </c:pt>
                 <c:pt idx="10">
-                  <c:v>1</c:v>
+                  <c:v>1.0</c:v>
                 </c:pt>
                 <c:pt idx="11">
-                  <c:v>1</c:v>
+                  <c:v>1.0</c:v>
                 </c:pt>
                 <c:pt idx="12">
-                  <c:v>1</c:v>
+                  <c:v>1.0</c:v>
                 </c:pt>
                 <c:pt idx="13">
-                  <c:v>1</c:v>
+                  <c:v>1.0</c:v>
                 </c:pt>
                 <c:pt idx="14">
-                  <c:v>1</c:v>
+                  <c:v>1.0</c:v>
                 </c:pt>
                 <c:pt idx="15">
-                  <c:v>1</c:v>
+                  <c:v>1.0</c:v>
                 </c:pt>
                 <c:pt idx="16">
-                  <c:v>1</c:v>
+                  <c:v>1.0</c:v>
                 </c:pt>
                 <c:pt idx="17">
-                  <c:v>1</c:v>
+                  <c:v>1.0</c:v>
                 </c:pt>
                 <c:pt idx="18">
-                  <c:v>1</c:v>
+                  <c:v>1.0</c:v>
                 </c:pt>
                 <c:pt idx="19">
-                  <c:v>1</c:v>
+                  <c:v>1.0</c:v>
                 </c:pt>
                 <c:pt idx="20">
-                  <c:v>1</c:v>
+                  <c:v>1.0</c:v>
                 </c:pt>
                 <c:pt idx="21">
-                  <c:v>1</c:v>
+                  <c:v>1.0</c:v>
                 </c:pt>
                 <c:pt idx="22">
-                  <c:v>1</c:v>
+                  <c:v>1.0</c:v>
                 </c:pt>
                 <c:pt idx="23">
-                  <c:v>1</c:v>
+                  <c:v>1.0</c:v>
                 </c:pt>
                 <c:pt idx="24">
-                  <c:v>1</c:v>
+                  <c:v>1.0</c:v>
                 </c:pt>
               </c:numCache>
             </c:numRef>
@@ -1220,6 +335,7 @@
               </c:strCache>
             </c:strRef>
           </c:tx>
+          <c:invertIfNegative val="0"/>
           <c:cat>
             <c:strRef>
               <c:f>Sheet2!$B$2:$B$26</c:f>
@@ -1313,13 +429,13 @@
                   <c:v>1.09355</c:v>
                 </c:pt>
                 <c:pt idx="1">
-                  <c:v>1</c:v>
+                  <c:v>1.0</c:v>
                 </c:pt>
                 <c:pt idx="2">
-                  <c:v>1.0088900000000001</c:v>
+                  <c:v>1.00889</c:v>
                 </c:pt>
                 <c:pt idx="3">
-                  <c:v>1.0105599999999999</c:v>
+                  <c:v>1.01056</c:v>
                 </c:pt>
                 <c:pt idx="4">
                   <c:v>1.00118</c:v>
@@ -1331,40 +447,40 @@
                   <c:v>1.00014</c:v>
                 </c:pt>
                 <c:pt idx="7">
-                  <c:v>1.0081800000000001</c:v>
+                  <c:v>1.00818</c:v>
                 </c:pt>
                 <c:pt idx="8">
-                  <c:v>1</c:v>
+                  <c:v>1.0</c:v>
                 </c:pt>
                 <c:pt idx="9">
-                  <c:v>1.0037700000000001</c:v>
+                  <c:v>1.00377</c:v>
                 </c:pt>
                 <c:pt idx="10">
-                  <c:v>1</c:v>
+                  <c:v>1.0</c:v>
                 </c:pt>
                 <c:pt idx="11">
-                  <c:v>1.0280100000000001</c:v>
+                  <c:v>1.02801</c:v>
                 </c:pt>
                 <c:pt idx="12">
                   <c:v>1.00281</c:v>
                 </c:pt>
                 <c:pt idx="13">
-                  <c:v>1.0146500000000001</c:v>
+                  <c:v>1.01465</c:v>
                 </c:pt>
                 <c:pt idx="14">
-                  <c:v>1.0066900000000001</c:v>
+                  <c:v>1.00669</c:v>
                 </c:pt>
                 <c:pt idx="15">
-                  <c:v>1.0099100000000001</c:v>
+                  <c:v>1.00991</c:v>
                 </c:pt>
                 <c:pt idx="16">
-                  <c:v>1.0454600000000001</c:v>
+                  <c:v>1.04546</c:v>
                 </c:pt>
                 <c:pt idx="17">
-                  <c:v>1.0024900000000001</c:v>
+                  <c:v>1.00249</c:v>
                 </c:pt>
                 <c:pt idx="18">
-                  <c:v>1.0328900000000001</c:v>
+                  <c:v>1.03289</c:v>
                 </c:pt>
                 <c:pt idx="19">
                   <c:v>1.05769</c:v>
@@ -1402,6 +518,7 @@
               </c:strCache>
             </c:strRef>
           </c:tx>
+          <c:invertIfNegative val="0"/>
           <c:cat>
             <c:strRef>
               <c:f>Sheet2!$B$2:$B$26</c:f>
@@ -1510,19 +627,19 @@
                   <c:v>1.1975</c:v>
                 </c:pt>
                 <c:pt idx="6">
-                  <c:v>0.95118000000000003</c:v>
+                  <c:v>0.95118</c:v>
                 </c:pt>
                 <c:pt idx="7">
                   <c:v>1.03085</c:v>
                 </c:pt>
                 <c:pt idx="8">
-                  <c:v>0.92237999999999998</c:v>
+                  <c:v>0.92238</c:v>
                 </c:pt>
                 <c:pt idx="9">
                   <c:v>1.0105</c:v>
                 </c:pt>
                 <c:pt idx="10">
-                  <c:v>1</c:v>
+                  <c:v>1.0</c:v>
                 </c:pt>
                 <c:pt idx="11">
                   <c:v>1.02376</c:v>
@@ -1531,28 +648,28 @@
                   <c:v>1.00258</c:v>
                 </c:pt>
                 <c:pt idx="13">
-                  <c:v>1.1704399999999999</c:v>
+                  <c:v>1.17044</c:v>
                 </c:pt>
                 <c:pt idx="14">
-                  <c:v>1.0379700000000001</c:v>
+                  <c:v>1.03797</c:v>
                 </c:pt>
                 <c:pt idx="15">
                   <c:v>1.00085</c:v>
                 </c:pt>
                 <c:pt idx="16">
-                  <c:v>0.93147999999999997</c:v>
+                  <c:v>0.93148</c:v>
                 </c:pt>
                 <c:pt idx="17">
-                  <c:v>1.0022500000000001</c:v>
+                  <c:v>1.00225</c:v>
                 </c:pt>
                 <c:pt idx="18">
-                  <c:v>0.98389000000000004</c:v>
+                  <c:v>0.98389</c:v>
                 </c:pt>
                 <c:pt idx="19">
                   <c:v>1.09331</c:v>
                 </c:pt>
                 <c:pt idx="20">
-                  <c:v>1.0324199999999999</c:v>
+                  <c:v>1.03242</c:v>
                 </c:pt>
                 <c:pt idx="21">
                   <c:v>0.99156</c:v>
@@ -1564,7 +681,7 @@
                   <c:v>0.99539</c:v>
                 </c:pt>
                 <c:pt idx="24">
-                  <c:v>1.0241400000000001</c:v>
+                  <c:v>1.02414</c:v>
                 </c:pt>
               </c:numCache>
             </c:numRef>
@@ -1584,6 +701,7 @@
               </c:strCache>
             </c:strRef>
           </c:tx>
+          <c:invertIfNegative val="0"/>
           <c:cat>
             <c:strRef>
               <c:f>Sheet2!$B$2:$B$26</c:f>
@@ -1674,37 +792,37 @@
                 <c:formatCode>General</c:formatCode>
                 <c:ptCount val="25"/>
                 <c:pt idx="0">
-                  <c:v>1.1881600000000001</c:v>
+                  <c:v>1.18816</c:v>
                 </c:pt>
                 <c:pt idx="1">
                   <c:v>1.18564</c:v>
                 </c:pt>
                 <c:pt idx="2">
-                  <c:v>1.0223500000000001</c:v>
+                  <c:v>1.02235</c:v>
                 </c:pt>
                 <c:pt idx="3">
-                  <c:v>1.0269699999999999</c:v>
+                  <c:v>1.02697</c:v>
                 </c:pt>
                 <c:pt idx="4">
-                  <c:v>1.0017199999999999</c:v>
+                  <c:v>1.00172</c:v>
                 </c:pt>
                 <c:pt idx="5">
-                  <c:v>1.1984900000000001</c:v>
+                  <c:v>1.19849</c:v>
                 </c:pt>
                 <c:pt idx="6">
-                  <c:v>0.95126999999999995</c:v>
+                  <c:v>0.95127</c:v>
                 </c:pt>
                 <c:pt idx="7">
                   <c:v>1.03851</c:v>
                 </c:pt>
                 <c:pt idx="8">
-                  <c:v>0.92237999999999998</c:v>
+                  <c:v>0.92238</c:v>
                 </c:pt>
                 <c:pt idx="9">
-                  <c:v>1.0152300000000001</c:v>
+                  <c:v>1.01523</c:v>
                 </c:pt>
                 <c:pt idx="10">
-                  <c:v>1.0000100000000001</c:v>
+                  <c:v>1.00001</c:v>
                 </c:pt>
                 <c:pt idx="11">
                   <c:v>1.03244</c:v>
@@ -1713,34 +831,34 @@
                   <c:v>1.00275</c:v>
                 </c:pt>
                 <c:pt idx="13">
-                  <c:v>1.2256899999999999</c:v>
+                  <c:v>1.22569</c:v>
                 </c:pt>
                 <c:pt idx="14">
-                  <c:v>1.0773600000000001</c:v>
+                  <c:v>1.07736</c:v>
                 </c:pt>
                 <c:pt idx="15">
-                  <c:v>1.0095799999999999</c:v>
+                  <c:v>1.00958</c:v>
                 </c:pt>
                 <c:pt idx="16">
-                  <c:v>0.95059000000000005</c:v>
+                  <c:v>0.95059</c:v>
                 </c:pt>
                 <c:pt idx="17">
-                  <c:v>1.0027699999999999</c:v>
+                  <c:v>1.00277</c:v>
                 </c:pt>
                 <c:pt idx="18">
                   <c:v>0.97053</c:v>
                 </c:pt>
                 <c:pt idx="19">
-                  <c:v>1.1068199999999999</c:v>
+                  <c:v>1.10682</c:v>
                 </c:pt>
                 <c:pt idx="20">
-                  <c:v>1.0344800000000001</c:v>
+                  <c:v>1.03448</c:v>
                 </c:pt>
                 <c:pt idx="21">
-                  <c:v>0.99146000000000001</c:v>
+                  <c:v>0.99146</c:v>
                 </c:pt>
                 <c:pt idx="22">
-                  <c:v>1.0308600000000001</c:v>
+                  <c:v>1.03086</c:v>
                 </c:pt>
                 <c:pt idx="23">
                   <c:v>1.00515</c:v>
@@ -1752,14 +870,24 @@
             </c:numRef>
           </c:val>
         </c:ser>
-        <c:axId val="124127488"/>
-        <c:axId val="124141952"/>
+        <c:dLbls>
+          <c:showLegendKey val="0"/>
+          <c:showVal val="0"/>
+          <c:showCatName val="0"/>
+          <c:showSerName val="0"/>
+          <c:showPercent val="0"/>
+          <c:showBubbleSize val="0"/>
+        </c:dLbls>
+        <c:gapWidth val="150"/>
+        <c:axId val="2028542760"/>
+        <c:axId val="2028548296"/>
       </c:barChart>
       <c:catAx>
-        <c:axId val="124127488"/>
+        <c:axId val="2028542760"/>
         <c:scaling>
           <c:orientation val="minMax"/>
         </c:scaling>
+        <c:delete val="0"/>
         <c:axPos val="b"/>
         <c:title>
           <c:tx>
@@ -1778,20 +906,25 @@
             </c:rich>
           </c:tx>
           <c:layout/>
+          <c:overlay val="0"/>
         </c:title>
+        <c:majorTickMark val="out"/>
+        <c:minorTickMark val="none"/>
         <c:tickLblPos val="nextTo"/>
-        <c:crossAx val="124141952"/>
+        <c:crossAx val="2028548296"/>
         <c:crosses val="autoZero"/>
         <c:auto val="1"/>
         <c:lblAlgn val="ctr"/>
         <c:lblOffset val="100"/>
+        <c:noMultiLvlLbl val="0"/>
       </c:catAx>
       <c:valAx>
-        <c:axId val="124141952"/>
+        <c:axId val="2028548296"/>
         <c:scaling>
           <c:orientation val="minMax"/>
           <c:min val="0.88"/>
         </c:scaling>
+        <c:delete val="0"/>
         <c:axPos val="l"/>
         <c:majorGridlines/>
         <c:title>
@@ -1811,10 +944,13 @@
             </c:rich>
           </c:tx>
           <c:layout/>
+          <c:overlay val="0"/>
         </c:title>
         <c:numFmt formatCode="General" sourceLinked="1"/>
+        <c:majorTickMark val="out"/>
+        <c:minorTickMark val="none"/>
         <c:tickLblPos val="nextTo"/>
-        <c:crossAx val="124127488"/>
+        <c:crossAx val="2028542760"/>
         <c:crosses val="autoZero"/>
         <c:crossBetween val="between"/>
       </c:valAx>
@@ -1825,14 +961,17 @@
         <c:manualLayout>
           <c:xMode val="edge"/>
           <c:yMode val="edge"/>
-          <c:x val="0.67242216046523584"/>
-          <c:y val="2.7107162591518165E-2"/>
-          <c:w val="0.14166071087872364"/>
-          <c:h val="0.27535294930239007"/>
+          <c:x val="0.672422160465236"/>
+          <c:y val="0.0271071625915182"/>
+          <c:w val="0.141660710878724"/>
+          <c:h val="0.27535294930239"/>
         </c:manualLayout>
       </c:layout>
+      <c:overlay val="0"/>
     </c:legend>
     <c:plotVisOnly val="1"/>
+    <c:dispBlanksAs val="gap"/>
+    <c:showDLblsOverMax val="0"/>
   </c:chart>
   <c:txPr>
     <a:bodyPr/>
@@ -1846,7 +985,471 @@
       <a:endParaRPr lang="en-US"/>
     </a:p>
   </c:txPr>
-  <c:externalData r:id="rId1"/>
+  <c:externalData r:id="rId1">
+    <c:autoUpdate val="0"/>
+  </c:externalData>
+</c:chartSpace>
+</file>
+
+<file path=ppt/charts/chart2.xml><?xml version="1.0" encoding="utf-8"?>
+<c:chartSpace xmlns:c="http://schemas.openxmlformats.org/drawingml/2006/chart" xmlns:a="http://schemas.openxmlformats.org/drawingml/2006/main" xmlns:r="http://schemas.openxmlformats.org/officeDocument/2006/relationships">
+  <c:date1904 val="0"/>
+  <c:lang val="en-US"/>
+  <c:roundedCorners val="0"/>
+  <mc:AlternateContent xmlns:mc="http://schemas.openxmlformats.org/markup-compatibility/2006">
+    <mc:Choice xmlns:c14="http://schemas.microsoft.com/office/drawing/2007/8/2/chart" Requires="c14">
+      <c14:style val="118"/>
+    </mc:Choice>
+    <mc:Fallback>
+      <c:style val="18"/>
+    </mc:Fallback>
+  </mc:AlternateContent>
+  <c:chart>
+    <c:title>
+      <c:tx>
+        <c:rich>
+          <a:bodyPr/>
+          <a:lstStyle/>
+          <a:p>
+            <a:pPr>
+              <a:defRPr/>
+            </a:pPr>
+            <a:r>
+              <a:rPr lang="en-US" sz="2800" b="1" i="0" baseline="0" dirty="0">
+                <a:effectLst/>
+              </a:rPr>
+              <a:t>Effect of Pooling on Base-Delta Block Types</a:t>
+            </a:r>
+            <a:endParaRPr lang="en-US" sz="2800" dirty="0">
+              <a:effectLst/>
+            </a:endParaRPr>
+          </a:p>
+        </c:rich>
+      </c:tx>
+      <c:layout/>
+      <c:overlay val="0"/>
+    </c:title>
+    <c:autoTitleDeleted val="0"/>
+    <c:plotArea>
+      <c:layout/>
+      <c:barChart>
+        <c:barDir val="col"/>
+        <c:grouping val="percentStacked"/>
+        <c:varyColors val="0"/>
+        <c:ser>
+          <c:idx val="2"/>
+          <c:order val="0"/>
+          <c:tx>
+            <c:v>LARGE</c:v>
+          </c:tx>
+          <c:spPr>
+            <a:solidFill>
+              <a:schemeClr val="tx1">
+                <a:lumMod val="85000"/>
+                <a:lumOff val="15000"/>
+              </a:schemeClr>
+            </a:solidFill>
+          </c:spPr>
+          <c:invertIfNegative val="0"/>
+          <c:cat>
+            <c:strRef>
+              <c:f>Sheet1!$A$47:$A$52</c:f>
+              <c:strCache>
+                <c:ptCount val="6"/>
+                <c:pt idx="0">
+                  <c:v>bisort</c:v>
+                </c:pt>
+                <c:pt idx="1">
+                  <c:v>bisort.pool</c:v>
+                </c:pt>
+                <c:pt idx="2">
+                  <c:v>llu</c:v>
+                </c:pt>
+                <c:pt idx="3">
+                  <c:v>llu.pool</c:v>
+                </c:pt>
+                <c:pt idx="4">
+                  <c:v>sort</c:v>
+                </c:pt>
+                <c:pt idx="5">
+                  <c:v>sort.pool</c:v>
+                </c:pt>
+              </c:strCache>
+            </c:strRef>
+          </c:cat>
+          <c:val>
+            <c:numRef>
+              <c:f>Sheet1!$E$47:$E$52</c:f>
+              <c:numCache>
+                <c:formatCode>General</c:formatCode>
+                <c:ptCount val="6"/>
+                <c:pt idx="0">
+                  <c:v>767.0</c:v>
+                </c:pt>
+                <c:pt idx="1">
+                  <c:v>488.0</c:v>
+                </c:pt>
+                <c:pt idx="2">
+                  <c:v>1763.0</c:v>
+                </c:pt>
+                <c:pt idx="3">
+                  <c:v>28.0</c:v>
+                </c:pt>
+                <c:pt idx="4">
+                  <c:v>251.0</c:v>
+                </c:pt>
+                <c:pt idx="5">
+                  <c:v>80.0</c:v>
+                </c:pt>
+              </c:numCache>
+            </c:numRef>
+          </c:val>
+        </c:ser>
+        <c:ser>
+          <c:idx val="0"/>
+          <c:order val="1"/>
+          <c:tx>
+            <c:v>MEDIUM</c:v>
+          </c:tx>
+          <c:spPr>
+            <a:solidFill>
+              <a:schemeClr val="tx1">
+                <a:lumMod val="75000"/>
+                <a:lumOff val="25000"/>
+              </a:schemeClr>
+            </a:solidFill>
+          </c:spPr>
+          <c:invertIfNegative val="0"/>
+          <c:cat>
+            <c:strRef>
+              <c:f>Sheet1!$A$47:$A$52</c:f>
+              <c:strCache>
+                <c:ptCount val="6"/>
+                <c:pt idx="0">
+                  <c:v>bisort</c:v>
+                </c:pt>
+                <c:pt idx="1">
+                  <c:v>bisort.pool</c:v>
+                </c:pt>
+                <c:pt idx="2">
+                  <c:v>llu</c:v>
+                </c:pt>
+                <c:pt idx="3">
+                  <c:v>llu.pool</c:v>
+                </c:pt>
+                <c:pt idx="4">
+                  <c:v>sort</c:v>
+                </c:pt>
+                <c:pt idx="5">
+                  <c:v>sort.pool</c:v>
+                </c:pt>
+              </c:strCache>
+            </c:strRef>
+          </c:cat>
+          <c:val>
+            <c:numRef>
+              <c:f>Sheet1!$D$47:$D$52</c:f>
+              <c:numCache>
+                <c:formatCode>General</c:formatCode>
+                <c:ptCount val="6"/>
+                <c:pt idx="0">
+                  <c:v>253.0</c:v>
+                </c:pt>
+                <c:pt idx="1">
+                  <c:v>152.0</c:v>
+                </c:pt>
+                <c:pt idx="2">
+                  <c:v>345.0</c:v>
+                </c:pt>
+                <c:pt idx="3">
+                  <c:v>624.0</c:v>
+                </c:pt>
+                <c:pt idx="4">
+                  <c:v>0.0</c:v>
+                </c:pt>
+                <c:pt idx="5">
+                  <c:v>0.0</c:v>
+                </c:pt>
+              </c:numCache>
+            </c:numRef>
+          </c:val>
+        </c:ser>
+        <c:ser>
+          <c:idx val="1"/>
+          <c:order val="2"/>
+          <c:tx>
+            <c:v>REPEATED</c:v>
+          </c:tx>
+          <c:spPr>
+            <a:solidFill>
+              <a:schemeClr val="tx1">
+                <a:lumMod val="65000"/>
+                <a:lumOff val="35000"/>
+              </a:schemeClr>
+            </a:solidFill>
+          </c:spPr>
+          <c:invertIfNegative val="0"/>
+          <c:cat>
+            <c:strRef>
+              <c:f>Sheet1!$A$47:$A$52</c:f>
+              <c:strCache>
+                <c:ptCount val="6"/>
+                <c:pt idx="0">
+                  <c:v>bisort</c:v>
+                </c:pt>
+                <c:pt idx="1">
+                  <c:v>bisort.pool</c:v>
+                </c:pt>
+                <c:pt idx="2">
+                  <c:v>llu</c:v>
+                </c:pt>
+                <c:pt idx="3">
+                  <c:v>llu.pool</c:v>
+                </c:pt>
+                <c:pt idx="4">
+                  <c:v>sort</c:v>
+                </c:pt>
+                <c:pt idx="5">
+                  <c:v>sort.pool</c:v>
+                </c:pt>
+              </c:strCache>
+            </c:strRef>
+          </c:cat>
+          <c:val>
+            <c:numRef>
+              <c:f>Sheet1!$C$47:$C$52</c:f>
+              <c:numCache>
+                <c:formatCode>General</c:formatCode>
+                <c:ptCount val="6"/>
+                <c:pt idx="0">
+                  <c:v>0.0</c:v>
+                </c:pt>
+                <c:pt idx="1">
+                  <c:v>0.0</c:v>
+                </c:pt>
+                <c:pt idx="2">
+                  <c:v>0.0</c:v>
+                </c:pt>
+                <c:pt idx="3">
+                  <c:v>97.0</c:v>
+                </c:pt>
+                <c:pt idx="4">
+                  <c:v>0.0</c:v>
+                </c:pt>
+                <c:pt idx="5">
+                  <c:v>0.0</c:v>
+                </c:pt>
+              </c:numCache>
+            </c:numRef>
+          </c:val>
+        </c:ser>
+        <c:ser>
+          <c:idx val="3"/>
+          <c:order val="3"/>
+          <c:tx>
+            <c:v>ZEROS</c:v>
+          </c:tx>
+          <c:spPr>
+            <a:solidFill>
+              <a:srgbClr val="008000"/>
+            </a:solidFill>
+          </c:spPr>
+          <c:invertIfNegative val="0"/>
+          <c:cat>
+            <c:strRef>
+              <c:f>Sheet1!$A$47:$A$52</c:f>
+              <c:strCache>
+                <c:ptCount val="6"/>
+                <c:pt idx="0">
+                  <c:v>bisort</c:v>
+                </c:pt>
+                <c:pt idx="1">
+                  <c:v>bisort.pool</c:v>
+                </c:pt>
+                <c:pt idx="2">
+                  <c:v>llu</c:v>
+                </c:pt>
+                <c:pt idx="3">
+                  <c:v>llu.pool</c:v>
+                </c:pt>
+                <c:pt idx="4">
+                  <c:v>sort</c:v>
+                </c:pt>
+                <c:pt idx="5">
+                  <c:v>sort.pool</c:v>
+                </c:pt>
+              </c:strCache>
+            </c:strRef>
+          </c:cat>
+          <c:val>
+            <c:numRef>
+              <c:f>Sheet1!$B$47:$B$52</c:f>
+              <c:numCache>
+                <c:formatCode>General</c:formatCode>
+                <c:ptCount val="6"/>
+                <c:pt idx="0">
+                  <c:v>4.0</c:v>
+                </c:pt>
+                <c:pt idx="1">
+                  <c:v>0.0</c:v>
+                </c:pt>
+                <c:pt idx="2">
+                  <c:v>0.0</c:v>
+                </c:pt>
+                <c:pt idx="3">
+                  <c:v>833.0</c:v>
+                </c:pt>
+                <c:pt idx="4">
+                  <c:v>0.0</c:v>
+                </c:pt>
+                <c:pt idx="5">
+                  <c:v>125.0</c:v>
+                </c:pt>
+              </c:numCache>
+            </c:numRef>
+          </c:val>
+        </c:ser>
+        <c:dLbls>
+          <c:showLegendKey val="0"/>
+          <c:showVal val="0"/>
+          <c:showCatName val="0"/>
+          <c:showSerName val="0"/>
+          <c:showPercent val="0"/>
+          <c:showBubbleSize val="0"/>
+        </c:dLbls>
+        <c:gapWidth val="150"/>
+        <c:overlap val="100"/>
+        <c:axId val="2131123192"/>
+        <c:axId val="2136602568"/>
+      </c:barChart>
+      <c:catAx>
+        <c:axId val="2131123192"/>
+        <c:scaling>
+          <c:orientation val="minMax"/>
+        </c:scaling>
+        <c:delete val="0"/>
+        <c:axPos val="b"/>
+        <c:majorTickMark val="out"/>
+        <c:minorTickMark val="none"/>
+        <c:tickLblPos val="nextTo"/>
+        <c:txPr>
+          <a:bodyPr/>
+          <a:lstStyle/>
+          <a:p>
+            <a:pPr>
+              <a:defRPr sz="2000"/>
+            </a:pPr>
+            <a:endParaRPr lang="en-US"/>
+          </a:p>
+        </c:txPr>
+        <c:crossAx val="2136602568"/>
+        <c:crosses val="autoZero"/>
+        <c:auto val="1"/>
+        <c:lblAlgn val="ctr"/>
+        <c:lblOffset val="100"/>
+        <c:noMultiLvlLbl val="0"/>
+      </c:catAx>
+      <c:valAx>
+        <c:axId val="2136602568"/>
+        <c:scaling>
+          <c:orientation val="minMax"/>
+        </c:scaling>
+        <c:delete val="0"/>
+        <c:axPos val="l"/>
+        <c:majorGridlines>
+          <c:spPr>
+            <a:ln>
+              <a:solidFill>
+                <a:schemeClr val="bg1">
+                  <a:lumMod val="85000"/>
+                </a:schemeClr>
+              </a:solidFill>
+            </a:ln>
+          </c:spPr>
+        </c:majorGridlines>
+        <c:title>
+          <c:tx>
+            <c:rich>
+              <a:bodyPr rot="-5400000" vert="horz"/>
+              <a:lstStyle/>
+              <a:p>
+                <a:pPr>
+                  <a:defRPr/>
+                </a:pPr>
+                <a:r>
+                  <a:rPr lang="en-US" sz="1800" dirty="0"/>
+                  <a:t>Fraction of Blocks Used of </a:t>
+                </a:r>
+                <a:r>
+                  <a:rPr lang="en-US" sz="1800" dirty="0" smtClean="0"/>
+                  <a:t>Particular </a:t>
+                </a:r>
+                <a:r>
+                  <a:rPr lang="en-US" sz="1800" dirty="0"/>
+                  <a:t>Type</a:t>
+                </a:r>
+              </a:p>
+            </c:rich>
+          </c:tx>
+          <c:layout/>
+          <c:overlay val="0"/>
+        </c:title>
+        <c:numFmt formatCode="0%" sourceLinked="0"/>
+        <c:majorTickMark val="out"/>
+        <c:minorTickMark val="none"/>
+        <c:tickLblPos val="nextTo"/>
+        <c:txPr>
+          <a:bodyPr/>
+          <a:lstStyle/>
+          <a:p>
+            <a:pPr>
+              <a:defRPr sz="1800"/>
+            </a:pPr>
+            <a:endParaRPr lang="en-US"/>
+          </a:p>
+        </c:txPr>
+        <c:crossAx val="2131123192"/>
+        <c:crosses val="autoZero"/>
+        <c:crossBetween val="between"/>
+        <c:majorUnit val="0.2"/>
+      </c:valAx>
+    </c:plotArea>
+    <c:legend>
+      <c:legendPos val="b"/>
+      <c:layout>
+        <c:manualLayout>
+          <c:xMode val="edge"/>
+          <c:yMode val="edge"/>
+          <c:x val="0.206113239223475"/>
+          <c:y val="0.910389454994596"/>
+          <c:w val="0.629980255846397"/>
+          <c:h val="0.0645752841987999"/>
+        </c:manualLayout>
+      </c:layout>
+      <c:overlay val="0"/>
+      <c:txPr>
+        <a:bodyPr/>
+        <a:lstStyle/>
+        <a:p>
+          <a:pPr>
+            <a:defRPr sz="1800"/>
+          </a:pPr>
+          <a:endParaRPr lang="en-US"/>
+        </a:p>
+      </c:txPr>
+    </c:legend>
+    <c:plotVisOnly val="1"/>
+    <c:dispBlanksAs val="zero"/>
+    <c:showDLblsOverMax val="0"/>
+  </c:chart>
+  <c:spPr>
+    <a:ln>
+      <a:noFill/>
+    </a:ln>
+  </c:spPr>
+  <c:externalData r:id="rId1">
+    <c:autoUpdate val="0"/>
+  </c:externalData>
 </c:chartSpace>
 </file>
 
@@ -2031,7 +1634,7 @@
           <a:p>
             <a:fld id="{8D47C13E-465A-42F8-8A27-38F6083141F5}" type="datetimeFigureOut">
               <a:rPr lang="en-US" smtClean="0"/>
-              <a:t>12/10/2012</a:t>
+              <a:t>12/13/13</a:t>
             </a:fld>
             <a:endParaRPr lang="en-US"/>
           </a:p>
@@ -2196,7 +1799,7 @@
           <a:p>
             <a:fld id="{8D47C13E-465A-42F8-8A27-38F6083141F5}" type="datetimeFigureOut">
               <a:rPr lang="en-US" smtClean="0"/>
-              <a:t>12/10/2012</a:t>
+              <a:t>12/13/13</a:t>
             </a:fld>
             <a:endParaRPr lang="en-US"/>
           </a:p>
@@ -2371,7 +1974,7 @@
           <a:p>
             <a:fld id="{8D47C13E-465A-42F8-8A27-38F6083141F5}" type="datetimeFigureOut">
               <a:rPr lang="en-US" smtClean="0"/>
-              <a:t>12/10/2012</a:t>
+              <a:t>12/13/13</a:t>
             </a:fld>
             <a:endParaRPr lang="en-US"/>
           </a:p>
@@ -2536,7 +2139,7 @@
           <a:p>
             <a:fld id="{8D47C13E-465A-42F8-8A27-38F6083141F5}" type="datetimeFigureOut">
               <a:rPr lang="en-US" smtClean="0"/>
-              <a:t>12/10/2012</a:t>
+              <a:t>12/13/13</a:t>
             </a:fld>
             <a:endParaRPr lang="en-US"/>
           </a:p>
@@ -2777,7 +2380,7 @@
           <a:p>
             <a:fld id="{8D47C13E-465A-42F8-8A27-38F6083141F5}" type="datetimeFigureOut">
               <a:rPr lang="en-US" smtClean="0"/>
-              <a:t>12/10/2012</a:t>
+              <a:t>12/13/13</a:t>
             </a:fld>
             <a:endParaRPr lang="en-US"/>
           </a:p>
@@ -3060,7 +2663,7 @@
           <a:p>
             <a:fld id="{8D47C13E-465A-42F8-8A27-38F6083141F5}" type="datetimeFigureOut">
               <a:rPr lang="en-US" smtClean="0"/>
-              <a:t>12/10/2012</a:t>
+              <a:t>12/13/13</a:t>
             </a:fld>
             <a:endParaRPr lang="en-US"/>
           </a:p>
@@ -3477,7 +3080,7 @@
           <a:p>
             <a:fld id="{8D47C13E-465A-42F8-8A27-38F6083141F5}" type="datetimeFigureOut">
               <a:rPr lang="en-US" smtClean="0"/>
-              <a:t>12/10/2012</a:t>
+              <a:t>12/13/13</a:t>
             </a:fld>
             <a:endParaRPr lang="en-US"/>
           </a:p>
@@ -3590,7 +3193,7 @@
           <a:p>
             <a:fld id="{8D47C13E-465A-42F8-8A27-38F6083141F5}" type="datetimeFigureOut">
               <a:rPr lang="en-US" smtClean="0"/>
-              <a:t>12/10/2012</a:t>
+              <a:t>12/13/13</a:t>
             </a:fld>
             <a:endParaRPr lang="en-US"/>
           </a:p>
@@ -3680,7 +3283,7 @@
           <a:p>
             <a:fld id="{8D47C13E-465A-42F8-8A27-38F6083141F5}" type="datetimeFigureOut">
               <a:rPr lang="en-US" smtClean="0"/>
-              <a:t>12/10/2012</a:t>
+              <a:t>12/13/13</a:t>
             </a:fld>
             <a:endParaRPr lang="en-US"/>
           </a:p>
@@ -3952,7 +3555,7 @@
           <a:p>
             <a:fld id="{8D47C13E-465A-42F8-8A27-38F6083141F5}" type="datetimeFigureOut">
               <a:rPr lang="en-US" smtClean="0"/>
-              <a:t>12/10/2012</a:t>
+              <a:t>12/13/13</a:t>
             </a:fld>
             <a:endParaRPr lang="en-US"/>
           </a:p>
@@ -4200,7 +3803,7 @@
           <a:p>
             <a:fld id="{8D47C13E-465A-42F8-8A27-38F6083141F5}" type="datetimeFigureOut">
               <a:rPr lang="en-US" smtClean="0"/>
-              <a:t>12/10/2012</a:t>
+              <a:t>12/13/13</a:t>
             </a:fld>
             <a:endParaRPr lang="en-US"/>
           </a:p>
@@ -4408,7 +4011,7 @@
           <a:p>
             <a:fld id="{8D47C13E-465A-42F8-8A27-38F6083141F5}" type="datetimeFigureOut">
               <a:rPr lang="en-US" smtClean="0"/>
-              <a:t>12/10/2012</a:t>
+              <a:t>12/13/13</a:t>
             </a:fld>
             <a:endParaRPr lang="en-US"/>
           </a:p>
@@ -4805,7 +4408,7 @@
               <a:rPr lang="en-US" b="1" dirty="0" smtClean="0">
                 <a:latin typeface="Garamond" pitchFamily="18" charset="0"/>
               </a:rPr>
-              <a:t>CARP: Compression Aware Replacement Policies</a:t>
+              <a:t>Enhanced Base-Delta Compression with Memory Pooling</a:t>
             </a:r>
             <a:endParaRPr lang="en-US" b="1" dirty="0">
               <a:latin typeface="Garamond" pitchFamily="18" charset="0"/>
@@ -4840,31 +4443,7 @@
               <a:rPr lang="en-US" sz="4000" dirty="0" smtClean="0">
                 <a:latin typeface="Garamond" pitchFamily="18" charset="0"/>
               </a:rPr>
-              <a:t>Tyler Huberty, </a:t>
-            </a:r>
-            <a:r>
-              <a:rPr lang="en-US" sz="4000" dirty="0" err="1" smtClean="0">
-                <a:latin typeface="Garamond" pitchFamily="18" charset="0"/>
-              </a:rPr>
-              <a:t>Rui</a:t>
-            </a:r>
-            <a:r>
-              <a:rPr lang="en-US" sz="4000" dirty="0" smtClean="0">
-                <a:latin typeface="Garamond" pitchFamily="18" charset="0"/>
-              </a:rPr>
-              <a:t> </a:t>
-            </a:r>
-            <a:r>
-              <a:rPr lang="en-US" sz="4000" dirty="0" err="1" smtClean="0">
-                <a:latin typeface="Garamond" pitchFamily="18" charset="0"/>
-              </a:rPr>
-              <a:t>Cai</a:t>
-            </a:r>
-            <a:r>
-              <a:rPr lang="en-US" sz="4000" dirty="0" smtClean="0">
-                <a:latin typeface="Garamond" pitchFamily="18" charset="0"/>
-              </a:rPr>
-              <a:t>, </a:t>
+              <a:t>Aditya Bhandaru, </a:t>
             </a:r>
             <a:r>
               <a:rPr lang="en-US" sz="4000" dirty="0">
@@ -4873,10 +4452,10 @@
               <a:t>Gennady </a:t>
             </a:r>
             <a:r>
-              <a:rPr lang="en-US" sz="4000" dirty="0" err="1">
+              <a:rPr lang="en-US" sz="4000" dirty="0" smtClean="0">
                 <a:latin typeface="Garamond" pitchFamily="18" charset="0"/>
               </a:rPr>
-              <a:t>Pekhimenko</a:t>
+              <a:t>Pekhimenko, Onur Mutlu</a:t>
             </a:r>
             <a:endParaRPr lang="en-US" sz="4000" dirty="0">
               <a:latin typeface="Garamond" pitchFamily="18" charset="0"/>
@@ -5581,22 +5160,6 @@
           </a:p>
         </p:txBody>
       </p:sp>
-      <p:graphicFrame>
-        <p:nvGraphicFramePr>
-          <p:cNvPr id="33" name="Chart 32"/>
-          <p:cNvGraphicFramePr/>
-          <p:nvPr/>
-        </p:nvGraphicFramePr>
-        <p:xfrm>
-          <a:off x="19964400" y="9067800"/>
-          <a:ext cx="6858000" cy="5046463"/>
-        </p:xfrm>
-        <a:graphic>
-          <a:graphicData uri="http://schemas.openxmlformats.org/drawingml/2006/chart">
-            <c:chart xmlns:c="http://schemas.openxmlformats.org/drawingml/2006/chart" xmlns:r="http://schemas.openxmlformats.org/officeDocument/2006/relationships" r:id="rId5"/>
-          </a:graphicData>
-        </a:graphic>
-      </p:graphicFrame>
       <p:sp>
         <p:nvSpPr>
           <p:cNvPr id="34" name="Rectangle 33"/>
@@ -5606,7 +5169,7 @@
         <p:spPr>
           <a:xfrm>
             <a:off x="533400" y="5638800"/>
-            <a:ext cx="12954000" cy="7478970"/>
+            <a:ext cx="12954000" cy="9202519"/>
           </a:xfrm>
           <a:prstGeom prst="rect">
             <a:avLst/>
@@ -5618,124 +5181,86 @@
           </a:bodyPr>
           <a:lstStyle/>
           <a:p>
-            <a:pPr>
-              <a:buFont typeface="Arial" pitchFamily="34" charset="0"/>
+            <a:pPr marL="571500" indent="-571500">
+              <a:buFont typeface="Arial"/>
               <a:buChar char="•"/>
             </a:pPr>
             <a:r>
-              <a:rPr lang="en-US" sz="4000" dirty="0" smtClean="0"/>
-              <a:t>Traditional cache replacement and insertion policies mainly focus on block </a:t>
-            </a:r>
-            <a:r>
-              <a:rPr lang="en-US" sz="4000" dirty="0">
+              <a:rPr lang="en-US" sz="4000" dirty="0" smtClean="0">
                 <a:solidFill>
-                  <a:srgbClr val="0000FF"/>
+                  <a:srgbClr val="008000"/>
                 </a:solidFill>
               </a:rPr>
-              <a:t>reuse</a:t>
-            </a:r>
-          </a:p>
-          <a:p>
-            <a:pPr>
-              <a:buFont typeface="Arial" pitchFamily="34" charset="0"/>
+              <a:t>Base-Delta </a:t>
+            </a:r>
+            <a:r>
+              <a:rPr lang="en-US" sz="4000" dirty="0" smtClean="0">
+                <a:solidFill>
+                  <a:srgbClr val="008000"/>
+                </a:solidFill>
+              </a:rPr>
+              <a:t>Compression </a:t>
+            </a:r>
+            <a:r>
+              <a:rPr lang="en-US" sz="4000" dirty="0"/>
+              <a:t>[Pekhimenko et. al., PACT’12</a:t>
+            </a:r>
+            <a:r>
+              <a:rPr lang="en-US" sz="4000" dirty="0" smtClean="0"/>
+              <a:t>] proposes a promising technique for increasing on chip cache capacity using </a:t>
+            </a:r>
+            <a:r>
+              <a:rPr lang="en-US" sz="4000" b="1" dirty="0" smtClean="0">
+                <a:solidFill>
+                  <a:srgbClr val="000000"/>
+                </a:solidFill>
+              </a:rPr>
+              <a:t>compression</a:t>
+            </a:r>
+            <a:r>
+              <a:rPr lang="en-US" sz="4000" dirty="0" smtClean="0"/>
+              <a:t>.</a:t>
+            </a:r>
+          </a:p>
+          <a:p>
+            <a:pPr marL="571500" indent="-571500">
+              <a:buFont typeface="Arial"/>
               <a:buChar char="•"/>
             </a:pPr>
             <a:r>
+              <a:rPr lang="en-US" sz="4000" b="1" dirty="0" smtClean="0"/>
+              <a:t>B+Δ </a:t>
+            </a:r>
+            <a:r>
               <a:rPr lang="en-US" sz="4000" dirty="0" smtClean="0"/>
-              <a:t>Recent literature has proposed </a:t>
-            </a:r>
-            <a:r>
-              <a:rPr lang="en-US" sz="4000" dirty="0">
-                <a:solidFill>
-                  <a:srgbClr val="0000FF"/>
-                </a:solidFill>
-              </a:rPr>
-              <a:t>cache compression</a:t>
+              <a:t>offers good compression but incurs an </a:t>
+            </a:r>
+            <a:r>
+              <a:rPr lang="en-US" sz="4000" b="1" dirty="0" smtClean="0"/>
+              <a:t>additional access latency</a:t>
             </a:r>
             <a:r>
               <a:rPr lang="en-US" sz="4000" dirty="0" smtClean="0"/>
-              <a:t>, a promising technique to increase on-chip cache capacity [</a:t>
-            </a:r>
-            <a:r>
-              <a:rPr lang="en-US" sz="4000" dirty="0" err="1" smtClean="0"/>
-              <a:t>Pekhimenko</a:t>
-            </a:r>
-            <a:r>
-              <a:rPr lang="en-US" sz="4000" dirty="0" smtClean="0"/>
-              <a:t> et. al., PACT’12]</a:t>
-            </a:r>
-            <a:endParaRPr lang="en-US" sz="4000" dirty="0" smtClean="0"/>
-          </a:p>
-          <a:p>
-            <a:pPr>
-              <a:buFont typeface="Arial" pitchFamily="34" charset="0"/>
+              <a:t>.</a:t>
+            </a:r>
+            <a:endParaRPr lang="en-US" sz="4000" dirty="0"/>
+          </a:p>
+          <a:p>
+            <a:pPr marL="571500" indent="-571500">
+              <a:buFont typeface="Arial"/>
               <a:buChar char="•"/>
             </a:pPr>
             <a:r>
+              <a:rPr lang="en-US" sz="4000" b="1" dirty="0"/>
+              <a:t>B+</a:t>
+            </a:r>
+            <a:r>
+              <a:rPr lang="en-US" sz="4000" b="1" dirty="0" smtClean="0"/>
+              <a:t>Δ </a:t>
+            </a:r>
+            <a:r>
               <a:rPr lang="en-US" sz="4000" dirty="0" smtClean="0"/>
-              <a:t>In a compressed cache, </a:t>
-            </a:r>
-            <a:r>
-              <a:rPr lang="en-US" sz="4000" dirty="0">
-                <a:solidFill>
-                  <a:srgbClr val="0000FF"/>
-                </a:solidFill>
-              </a:rPr>
-              <a:t>block size </a:t>
-            </a:r>
-            <a:r>
-              <a:rPr lang="en-US" sz="4000" dirty="0" smtClean="0"/>
-              <a:t>is an additional dimension</a:t>
-            </a:r>
-          </a:p>
-          <a:p>
-            <a:pPr>
-              <a:buFont typeface="Arial" pitchFamily="34" charset="0"/>
-              <a:buChar char="•"/>
-            </a:pPr>
-            <a:r>
-              <a:rPr lang="en-US" sz="4000" b="1" u="sng" dirty="0" smtClean="0"/>
-              <a:t>Observation</a:t>
-            </a:r>
-            <a:r>
-              <a:rPr lang="en-US" sz="4000" dirty="0" smtClean="0"/>
-              <a:t>: The block most likely to be reused soon may no longer be the best block to keep in the cache</a:t>
-            </a:r>
-          </a:p>
-          <a:p>
-            <a:pPr>
-              <a:buFont typeface="Arial" pitchFamily="34" charset="0"/>
-              <a:buChar char="•"/>
-            </a:pPr>
-            <a:r>
-              <a:rPr lang="en-US" sz="4000" b="1" u="sng" dirty="0" smtClean="0">
-                <a:solidFill>
-                  <a:srgbClr val="0000FF"/>
-                </a:solidFill>
-              </a:rPr>
-              <a:t>Key Idea</a:t>
-            </a:r>
-            <a:r>
-              <a:rPr lang="en-US" sz="4000" dirty="0" smtClean="0">
-                <a:solidFill>
-                  <a:srgbClr val="0000FF"/>
-                </a:solidFill>
-              </a:rPr>
-              <a:t>: Use compressed block size in making cache replacement decisions</a:t>
-            </a:r>
-          </a:p>
-          <a:p>
-            <a:pPr>
-              <a:buFont typeface="Arial" pitchFamily="34" charset="0"/>
-              <a:buChar char="•"/>
-            </a:pPr>
-            <a:r>
-              <a:rPr lang="en-US" sz="4000" b="1" u="sng" dirty="0" smtClean="0"/>
-              <a:t>Solution</a:t>
-            </a:r>
-            <a:r>
-              <a:rPr lang="en-US" sz="4000" dirty="0" smtClean="0"/>
-              <a:t>: We propose three mechanisms: </a:t>
+              <a:t>suffers </a:t>
             </a:r>
             <a:r>
               <a:rPr lang="en-US" sz="4000" dirty="0" smtClean="0">
@@ -5743,11 +5268,11 @@
                   <a:srgbClr val="FF0000"/>
                 </a:solidFill>
               </a:rPr>
-              <a:t>Min-LRU</a:t>
+              <a:t>poor compressibility</a:t>
             </a:r>
             <a:r>
               <a:rPr lang="en-US" sz="4000" dirty="0" smtClean="0"/>
-              <a:t>, </a:t>
+              <a:t> when adjacent data in memory have </a:t>
             </a:r>
             <a:r>
               <a:rPr lang="en-US" sz="4000" dirty="0" smtClean="0">
@@ -5755,21 +5280,128 @@
                   <a:srgbClr val="FF0000"/>
                 </a:solidFill>
               </a:rPr>
-              <a:t>Min-Eviction</a:t>
+              <a:t>large value ranges</a:t>
             </a:r>
             <a:r>
               <a:rPr lang="en-US" sz="4000" dirty="0" smtClean="0"/>
-              <a:t>, and </a:t>
+              <a:t>.</a:t>
+            </a:r>
+          </a:p>
+          <a:p>
+            <a:endParaRPr lang="en-US" sz="3200" dirty="0" smtClean="0"/>
+          </a:p>
+          <a:p>
+            <a:pPr marL="571500" indent="-571500">
+              <a:buFont typeface="Arial"/>
+              <a:buChar char="•"/>
+            </a:pPr>
+            <a:r>
+              <a:rPr lang="en-US" sz="4000" b="1" u="sng" dirty="0" smtClean="0"/>
+              <a:t>Observation</a:t>
+            </a:r>
+            <a:r>
+              <a:rPr lang="en-US" sz="4000" dirty="0" smtClean="0"/>
+              <a:t>: Traditional compilers and memory-allocators are unaware of </a:t>
+            </a:r>
+            <a:r>
+              <a:rPr lang="en-US" sz="4000" b="1" dirty="0" smtClean="0"/>
+              <a:t>B</a:t>
+            </a:r>
+            <a:r>
+              <a:rPr lang="en-US" sz="4000" b="1" dirty="0"/>
+              <a:t>+</a:t>
+            </a:r>
+            <a:r>
+              <a:rPr lang="en-US" sz="4000" b="1" dirty="0" smtClean="0"/>
+              <a:t>Δ </a:t>
+            </a:r>
+            <a:r>
+              <a:rPr lang="en-US" sz="4000" dirty="0" smtClean="0"/>
+              <a:t>cache compression in hardware.</a:t>
+            </a:r>
+            <a:endParaRPr lang="en-US" sz="4000" dirty="0" smtClean="0"/>
+          </a:p>
+          <a:p>
+            <a:pPr marL="571500" indent="-571500">
+              <a:buFont typeface="Arial"/>
+              <a:buChar char="•"/>
+            </a:pPr>
+            <a:r>
+              <a:rPr lang="en-US" sz="4000" b="1" u="sng" dirty="0" smtClean="0">
+                <a:solidFill>
+                  <a:srgbClr val="008000"/>
+                </a:solidFill>
+              </a:rPr>
+              <a:t>Key Idea</a:t>
             </a:r>
             <a:r>
               <a:rPr lang="en-US" sz="4000" dirty="0" smtClean="0">
                 <a:solidFill>
-                  <a:srgbClr val="FF0000"/>
+                  <a:srgbClr val="008000"/>
                 </a:solidFill>
               </a:rPr>
-              <a:t>Global Min-Eviction</a:t>
-            </a:r>
-            <a:endParaRPr lang="en-US" sz="4000" dirty="0">
+              <a:t>: Arrange data in memory to optimize </a:t>
+            </a:r>
+            <a:r>
+              <a:rPr lang="en-US" sz="4000" dirty="0">
+                <a:solidFill>
+                  <a:srgbClr val="008000"/>
+                </a:solidFill>
+              </a:rPr>
+              <a:t>B+Δ </a:t>
+            </a:r>
+            <a:r>
+              <a:rPr lang="en-US" sz="4000" dirty="0" smtClean="0">
+                <a:solidFill>
+                  <a:srgbClr val="008000"/>
+                </a:solidFill>
+              </a:rPr>
+              <a:t>compressibility.</a:t>
+            </a:r>
+            <a:endParaRPr lang="en-US" sz="3200" dirty="0" smtClean="0">
+              <a:solidFill>
+                <a:srgbClr val="0000FF"/>
+              </a:solidFill>
+            </a:endParaRPr>
+          </a:p>
+          <a:p>
+            <a:pPr marL="571500" indent="-571500">
+              <a:buFont typeface="Arial"/>
+              <a:buChar char="•"/>
+            </a:pPr>
+            <a:r>
+              <a:rPr lang="en-US" sz="4000" b="1" u="sng" dirty="0" smtClean="0"/>
+              <a:t>Solution</a:t>
+            </a:r>
+            <a:r>
+              <a:rPr lang="en-US" sz="4000" dirty="0" smtClean="0"/>
+              <a:t>: Recent literature on </a:t>
+            </a:r>
+            <a:r>
+              <a:rPr lang="en-US" sz="4000" dirty="0" smtClean="0">
+                <a:solidFill>
+                  <a:srgbClr val="3366FF"/>
+                </a:solidFill>
+              </a:rPr>
+              <a:t>Memory Pooling </a:t>
+            </a:r>
+            <a:r>
+              <a:rPr lang="en-US" sz="4000" dirty="0" smtClean="0"/>
+              <a:t>and </a:t>
+            </a:r>
+            <a:r>
+              <a:rPr lang="en-US" sz="4000" dirty="0" smtClean="0">
+                <a:solidFill>
+                  <a:srgbClr val="3366FF"/>
+                </a:solidFill>
+              </a:rPr>
+              <a:t>Data Splitting</a:t>
+            </a:r>
+            <a:r>
+              <a:rPr lang="en-US" sz="4000" dirty="0" smtClean="0"/>
+              <a:t> [Curial et. al., ISMM’08] and related work seem promising.</a:t>
+            </a:r>
+            <a:endParaRPr lang="en-US" sz="4000" dirty="0" smtClean="0">
               <a:solidFill>
                 <a:srgbClr val="FF0000"/>
               </a:solidFill>
@@ -5786,7 +5418,7 @@
         <p:spPr>
           <a:xfrm>
             <a:off x="14020800" y="5638800"/>
-            <a:ext cx="12954000" cy="3724096"/>
+            <a:ext cx="12954000" cy="4462760"/>
           </a:xfrm>
           <a:prstGeom prst="rect">
             <a:avLst/>
@@ -5813,116 +5445,108 @@
                   <a:srgbClr val="FF0000"/>
                 </a:solidFill>
               </a:rPr>
-              <a:t>: How can we maximize cache performance utilizing both block reuse and size?</a:t>
-            </a:r>
-          </a:p>
-          <a:p>
-            <a:pPr>
-              <a:buFont typeface="Arial" pitchFamily="34" charset="0"/>
+              <a:t>: Can we mitigate low compressibility cases for </a:t>
+            </a:r>
+            <a:r>
+              <a:rPr lang="en-US" sz="4000" b="1" dirty="0"/>
+              <a:t>B+</a:t>
+            </a:r>
+            <a:r>
+              <a:rPr lang="en-US" sz="4000" b="1" dirty="0" smtClean="0"/>
+              <a:t>Δ</a:t>
+            </a:r>
+            <a:r>
+              <a:rPr lang="en-US" sz="4000" dirty="0" smtClean="0"/>
+              <a:t> compression?</a:t>
+            </a:r>
+            <a:endParaRPr lang="en-US" sz="4000" dirty="0" smtClean="0">
+              <a:solidFill>
+                <a:srgbClr val="FF0000"/>
+              </a:solidFill>
+            </a:endParaRPr>
+          </a:p>
+          <a:p>
+            <a:pPr marL="457200" indent="-457200">
+              <a:buFont typeface="Arial"/>
               <a:buChar char="•"/>
             </a:pPr>
             <a:r>
-              <a:rPr lang="en-US" sz="4000" dirty="0" smtClean="0"/>
-              <a:t> </a:t>
-            </a:r>
-            <a:r>
               <a:rPr lang="en-US" sz="3200" dirty="0" smtClean="0"/>
-              <a:t>No existing policy considers the many varied block sizes </a:t>
-            </a:r>
-            <a:r>
-              <a:rPr lang="en-US" sz="3200" b="1" dirty="0" smtClean="0"/>
-              <a:t>and</a:t>
+              <a:t>Increase viability for </a:t>
+            </a:r>
+            <a:r>
+              <a:rPr lang="el-GR" sz="3200" dirty="0"/>
+              <a:t>B+</a:t>
+            </a:r>
+            <a:r>
+              <a:rPr lang="el-GR" sz="3200" dirty="0" smtClean="0"/>
+              <a:t>Δ</a:t>
             </a:r>
             <a:r>
               <a:rPr lang="en-US" sz="3200" dirty="0" smtClean="0"/>
-              <a:t> potentials for reuse in making a replacement decision</a:t>
-            </a:r>
-            <a:endParaRPr lang="en-US" sz="4000" dirty="0"/>
-          </a:p>
-          <a:p>
-            <a:r>
-              <a:rPr lang="en-US" sz="4000" u="sng" dirty="0" smtClean="0"/>
-              <a:t>We propose compression aware replacement policies</a:t>
-            </a:r>
-            <a:endParaRPr lang="en-US" sz="4000" u="sng" dirty="0" smtClean="0"/>
-          </a:p>
-          <a:p>
-            <a:endParaRPr lang="en-US" sz="4400" dirty="0"/>
-          </a:p>
-        </p:txBody>
-      </p:sp>
-      <p:sp>
-        <p:nvSpPr>
-          <p:cNvPr id="36" name="TextBox 35"/>
-          <p:cNvSpPr txBox="1"/>
-          <p:nvPr/>
-        </p:nvSpPr>
-        <p:spPr>
-          <a:xfrm>
-            <a:off x="19507200" y="13868400"/>
-            <a:ext cx="7543800" cy="954107"/>
-          </a:xfrm>
-          <a:prstGeom prst="rect">
-            <a:avLst/>
-          </a:prstGeom>
-          <a:noFill/>
-        </p:spPr>
-        <p:txBody>
-          <a:bodyPr wrap="square" rtlCol="0">
-            <a:spAutoFit/>
-          </a:bodyPr>
-          <a:lstStyle/>
-          <a:p>
-            <a:pPr algn="ctr"/>
-            <a:r>
-              <a:rPr lang="en-US" sz="2800" dirty="0" smtClean="0"/>
-              <a:t>Distribution of Compressed Block Sizes (in bytes): potentially useful to replacement decision</a:t>
-            </a:r>
-            <a:endParaRPr lang="en-US" sz="2800" dirty="0"/>
-          </a:p>
-        </p:txBody>
-      </p:sp>
-      <p:sp>
-        <p:nvSpPr>
-          <p:cNvPr id="37" name="Rectangle 36"/>
-          <p:cNvSpPr/>
-          <p:nvPr/>
-        </p:nvSpPr>
-        <p:spPr>
-          <a:xfrm>
-            <a:off x="14249400" y="13456146"/>
-            <a:ext cx="5562600" cy="3231654"/>
-          </a:xfrm>
-          <a:prstGeom prst="rect">
-            <a:avLst/>
-          </a:prstGeom>
-        </p:spPr>
-        <p:txBody>
-          <a:bodyPr wrap="square">
-            <a:spAutoFit/>
-          </a:bodyPr>
-          <a:lstStyle/>
-          <a:p>
-            <a:r>
-              <a:rPr lang="en-US" sz="2400" b="1" dirty="0" smtClean="0"/>
-              <a:t>Shortcoming of Traditional LRU</a:t>
-            </a:r>
-          </a:p>
-          <a:p>
-            <a:pPr>
-              <a:buFont typeface="Arial" pitchFamily="34" charset="0"/>
+              <a:t> implementation in hardware, and justify the extra access latency.</a:t>
+            </a:r>
+          </a:p>
+          <a:p>
+            <a:pPr marL="457200" indent="-457200">
+              <a:buFont typeface="Arial"/>
               <a:buChar char="•"/>
             </a:pPr>
             <a:r>
-              <a:rPr lang="en-US" sz="2400" dirty="0" smtClean="0"/>
-              <a:t>LRU evicts more than necessary, underutilizing cache capacity</a:t>
-            </a:r>
-          </a:p>
-          <a:p>
-            <a:endParaRPr lang="en-US" sz="4400" dirty="0"/>
-          </a:p>
-          <a:p>
-            <a:endParaRPr lang="en-US" sz="4400" dirty="0" smtClean="0"/>
+              <a:rPr lang="en-US" sz="3200" dirty="0" smtClean="0"/>
+              <a:t>Proposals like Memory Pooling and Data Splitting </a:t>
+            </a:r>
+            <a:r>
+              <a:rPr lang="en-US" sz="3200" b="1" dirty="0" smtClean="0"/>
+              <a:t>already improve locality and reduce value range</a:t>
+            </a:r>
+            <a:r>
+              <a:rPr lang="en-US" sz="3200" dirty="0" smtClean="0"/>
+              <a:t> in adjacent data values.</a:t>
+            </a:r>
+          </a:p>
+          <a:p>
+            <a:pPr marL="457200" indent="-457200">
+              <a:buFont typeface="Arial"/>
+              <a:buChar char="•"/>
+            </a:pPr>
+            <a:r>
+              <a:rPr lang="en-US" sz="3200" dirty="0" smtClean="0">
+                <a:solidFill>
+                  <a:srgbClr val="008000"/>
+                </a:solidFill>
+              </a:rPr>
+              <a:t>But they have not yet been applied to </a:t>
+            </a:r>
+            <a:r>
+              <a:rPr lang="en-US" sz="3200" b="1" dirty="0">
+                <a:solidFill>
+                  <a:srgbClr val="008000"/>
+                </a:solidFill>
+              </a:rPr>
+              <a:t>B+</a:t>
+            </a:r>
+            <a:r>
+              <a:rPr lang="en-US" sz="3200" b="1" dirty="0" smtClean="0">
+                <a:solidFill>
+                  <a:srgbClr val="008000"/>
+                </a:solidFill>
+              </a:rPr>
+              <a:t>Δ</a:t>
+            </a:r>
+            <a:r>
+              <a:rPr lang="en-US" sz="3200" dirty="0" smtClean="0">
+                <a:solidFill>
+                  <a:srgbClr val="008000"/>
+                </a:solidFill>
+              </a:rPr>
+              <a:t>!</a:t>
+            </a:r>
+            <a:endParaRPr lang="en-US" sz="3200" dirty="0">
+              <a:solidFill>
+                <a:srgbClr val="008000"/>
+              </a:solidFill>
+            </a:endParaRPr>
           </a:p>
           <a:p>
             <a:endParaRPr lang="en-US" sz="4400" dirty="0"/>
@@ -5941,7 +5565,7 @@
         </p:xfrm>
         <a:graphic>
           <a:graphicData uri="http://schemas.openxmlformats.org/drawingml/2006/chart">
-            <c:chart xmlns:c="http://schemas.openxmlformats.org/drawingml/2006/chart" xmlns:r="http://schemas.openxmlformats.org/officeDocument/2006/relationships" r:id="rId6"/>
+            <c:chart xmlns:c="http://schemas.openxmlformats.org/drawingml/2006/chart" xmlns:r="http://schemas.openxmlformats.org/officeDocument/2006/relationships" r:id="rId5"/>
           </a:graphicData>
         </a:graphic>
       </p:graphicFrame>
@@ -6014,604 +5638,6 @@
           </a:p>
         </p:txBody>
       </p:sp>
-      <p:grpSp>
-        <p:nvGrpSpPr>
-          <p:cNvPr id="107" name="Group 106"/>
-          <p:cNvGrpSpPr/>
-          <p:nvPr/>
-        </p:nvGrpSpPr>
-        <p:grpSpPr>
-          <a:xfrm>
-            <a:off x="14325600" y="8915400"/>
-            <a:ext cx="4800600" cy="4343400"/>
-            <a:chOff x="685800" y="16992600"/>
-            <a:chExt cx="6629400" cy="4800600"/>
-          </a:xfrm>
-        </p:grpSpPr>
-        <p:sp>
-          <p:nvSpPr>
-            <p:cNvPr id="41" name="Rectangle 40"/>
-            <p:cNvSpPr/>
-            <p:nvPr/>
-          </p:nvSpPr>
-          <p:spPr>
-            <a:xfrm>
-              <a:off x="685800" y="18516600"/>
-              <a:ext cx="6553200" cy="914400"/>
-            </a:xfrm>
-            <a:prstGeom prst="rect">
-              <a:avLst/>
-            </a:prstGeom>
-          </p:spPr>
-          <p:style>
-            <a:lnRef idx="1">
-              <a:schemeClr val="dk1"/>
-            </a:lnRef>
-            <a:fillRef idx="2">
-              <a:schemeClr val="dk1"/>
-            </a:fillRef>
-            <a:effectRef idx="1">
-              <a:schemeClr val="dk1"/>
-            </a:effectRef>
-            <a:fontRef idx="minor">
-              <a:schemeClr val="dk1"/>
-            </a:fontRef>
-          </p:style>
-          <p:txBody>
-            <a:bodyPr rtlCol="0" anchor="ctr"/>
-            <a:lstStyle/>
-            <a:p>
-              <a:pPr algn="ctr"/>
-              <a:endParaRPr lang="en-US" sz="6000"/>
-            </a:p>
-          </p:txBody>
-        </p:sp>
-        <p:sp>
-          <p:nvSpPr>
-            <p:cNvPr id="42" name="TextBox 41"/>
-            <p:cNvSpPr txBox="1"/>
-            <p:nvPr/>
-          </p:nvSpPr>
-          <p:spPr>
-            <a:xfrm>
-              <a:off x="1828800" y="18592800"/>
-              <a:ext cx="2057399" cy="646330"/>
-            </a:xfrm>
-            <a:prstGeom prst="rect">
-              <a:avLst/>
-            </a:prstGeom>
-          </p:spPr>
-          <p:style>
-            <a:lnRef idx="2">
-              <a:schemeClr val="accent1">
-                <a:shade val="50000"/>
-              </a:schemeClr>
-            </a:lnRef>
-            <a:fillRef idx="1">
-              <a:schemeClr val="accent1"/>
-            </a:fillRef>
-            <a:effectRef idx="0">
-              <a:schemeClr val="accent1"/>
-            </a:effectRef>
-            <a:fontRef idx="minor">
-              <a:schemeClr val="lt1"/>
-            </a:fontRef>
-          </p:style>
-          <p:txBody>
-            <a:bodyPr wrap="square" rtlCol="0">
-              <a:spAutoFit/>
-            </a:bodyPr>
-            <a:lstStyle/>
-            <a:p>
-              <a:pPr algn="ctr"/>
-              <a:r>
-                <a:rPr lang="en-US" sz="3200" dirty="0" smtClean="0"/>
-                <a:t>4x</a:t>
-              </a:r>
-              <a:endParaRPr lang="en-US" sz="3200" dirty="0"/>
-            </a:p>
-          </p:txBody>
-        </p:sp>
-        <p:sp>
-          <p:nvSpPr>
-            <p:cNvPr id="43" name="TextBox 42"/>
-            <p:cNvSpPr txBox="1"/>
-            <p:nvPr/>
-          </p:nvSpPr>
-          <p:spPr>
-            <a:xfrm>
-              <a:off x="4191000" y="18592800"/>
-              <a:ext cx="762000" cy="646330"/>
-            </a:xfrm>
-            <a:prstGeom prst="rect">
-              <a:avLst/>
-            </a:prstGeom>
-          </p:spPr>
-          <p:style>
-            <a:lnRef idx="2">
-              <a:schemeClr val="accent1">
-                <a:shade val="50000"/>
-              </a:schemeClr>
-            </a:lnRef>
-            <a:fillRef idx="1">
-              <a:schemeClr val="accent1"/>
-            </a:fillRef>
-            <a:effectRef idx="0">
-              <a:schemeClr val="accent1"/>
-            </a:effectRef>
-            <a:fontRef idx="minor">
-              <a:schemeClr val="lt1"/>
-            </a:fontRef>
-          </p:style>
-          <p:txBody>
-            <a:bodyPr wrap="square" rtlCol="0">
-              <a:spAutoFit/>
-            </a:bodyPr>
-            <a:lstStyle/>
-            <a:p>
-              <a:pPr algn="ctr"/>
-              <a:r>
-                <a:rPr lang="en-US" sz="3200" dirty="0" smtClean="0"/>
-                <a:t>x</a:t>
-              </a:r>
-              <a:endParaRPr lang="en-US" sz="3200" dirty="0"/>
-            </a:p>
-          </p:txBody>
-        </p:sp>
-        <p:sp>
-          <p:nvSpPr>
-            <p:cNvPr id="44" name="TextBox 43"/>
-            <p:cNvSpPr txBox="1"/>
-            <p:nvPr/>
-          </p:nvSpPr>
-          <p:spPr>
-            <a:xfrm>
-              <a:off x="5257801" y="18592800"/>
-              <a:ext cx="762000" cy="646330"/>
-            </a:xfrm>
-            <a:prstGeom prst="rect">
-              <a:avLst/>
-            </a:prstGeom>
-          </p:spPr>
-          <p:style>
-            <a:lnRef idx="2">
-              <a:schemeClr val="accent1">
-                <a:shade val="50000"/>
-              </a:schemeClr>
-            </a:lnRef>
-            <a:fillRef idx="1">
-              <a:schemeClr val="accent1"/>
-            </a:fillRef>
-            <a:effectRef idx="0">
-              <a:schemeClr val="accent1"/>
-            </a:effectRef>
-            <a:fontRef idx="minor">
-              <a:schemeClr val="lt1"/>
-            </a:fontRef>
-          </p:style>
-          <p:txBody>
-            <a:bodyPr wrap="square" rtlCol="0">
-              <a:spAutoFit/>
-            </a:bodyPr>
-            <a:lstStyle/>
-            <a:p>
-              <a:pPr algn="ctr"/>
-              <a:r>
-                <a:rPr lang="en-US" sz="3200" dirty="0" smtClean="0"/>
-                <a:t>x</a:t>
-              </a:r>
-              <a:endParaRPr lang="en-US" sz="3200" dirty="0"/>
-            </a:p>
-          </p:txBody>
-        </p:sp>
-        <p:sp>
-          <p:nvSpPr>
-            <p:cNvPr id="45" name="TextBox 44"/>
-            <p:cNvSpPr txBox="1"/>
-            <p:nvPr/>
-          </p:nvSpPr>
-          <p:spPr>
-            <a:xfrm>
-              <a:off x="6324600" y="18592800"/>
-              <a:ext cx="762000" cy="646330"/>
-            </a:xfrm>
-            <a:prstGeom prst="rect">
-              <a:avLst/>
-            </a:prstGeom>
-          </p:spPr>
-          <p:style>
-            <a:lnRef idx="2">
-              <a:schemeClr val="accent1">
-                <a:shade val="50000"/>
-              </a:schemeClr>
-            </a:lnRef>
-            <a:fillRef idx="1">
-              <a:schemeClr val="accent1"/>
-            </a:fillRef>
-            <a:effectRef idx="0">
-              <a:schemeClr val="accent1"/>
-            </a:effectRef>
-            <a:fontRef idx="minor">
-              <a:schemeClr val="lt1"/>
-            </a:fontRef>
-          </p:style>
-          <p:txBody>
-            <a:bodyPr wrap="square" rtlCol="0">
-              <a:spAutoFit/>
-            </a:bodyPr>
-            <a:lstStyle/>
-            <a:p>
-              <a:pPr algn="ctr"/>
-              <a:r>
-                <a:rPr lang="en-US" sz="3200" dirty="0" smtClean="0"/>
-                <a:t>x</a:t>
-              </a:r>
-              <a:endParaRPr lang="en-US" sz="3200" dirty="0"/>
-            </a:p>
-          </p:txBody>
-        </p:sp>
-        <p:sp>
-          <p:nvSpPr>
-            <p:cNvPr id="46" name="TextBox 45"/>
-            <p:cNvSpPr txBox="1"/>
-            <p:nvPr/>
-          </p:nvSpPr>
-          <p:spPr>
-            <a:xfrm>
-              <a:off x="838201" y="18745200"/>
-              <a:ext cx="1143000" cy="442227"/>
-            </a:xfrm>
-            <a:prstGeom prst="rect">
-              <a:avLst/>
-            </a:prstGeom>
-            <a:noFill/>
-          </p:spPr>
-          <p:txBody>
-            <a:bodyPr wrap="square" rtlCol="0">
-              <a:spAutoFit/>
-            </a:bodyPr>
-            <a:lstStyle/>
-            <a:p>
-              <a:r>
-                <a:rPr lang="en-US" sz="2000" b="1" dirty="0" smtClean="0"/>
-                <a:t>Set 0</a:t>
-              </a:r>
-              <a:endParaRPr lang="en-US" sz="2000" b="1" dirty="0"/>
-            </a:p>
-          </p:txBody>
-        </p:sp>
-        <p:sp>
-          <p:nvSpPr>
-            <p:cNvPr id="47" name="TextBox 46"/>
-            <p:cNvSpPr txBox="1"/>
-            <p:nvPr/>
-          </p:nvSpPr>
-          <p:spPr>
-            <a:xfrm>
-              <a:off x="5181600" y="16992600"/>
-              <a:ext cx="2057399" cy="646330"/>
-            </a:xfrm>
-            <a:prstGeom prst="rect">
-              <a:avLst/>
-            </a:prstGeom>
-          </p:spPr>
-          <p:style>
-            <a:lnRef idx="2">
-              <a:schemeClr val="accent2">
-                <a:shade val="50000"/>
-              </a:schemeClr>
-            </a:lnRef>
-            <a:fillRef idx="1">
-              <a:schemeClr val="accent2"/>
-            </a:fillRef>
-            <a:effectRef idx="0">
-              <a:schemeClr val="accent2"/>
-            </a:effectRef>
-            <a:fontRef idx="minor">
-              <a:schemeClr val="lt1"/>
-            </a:fontRef>
-          </p:style>
-          <p:txBody>
-            <a:bodyPr wrap="square" rtlCol="0">
-              <a:spAutoFit/>
-            </a:bodyPr>
-            <a:lstStyle/>
-            <a:p>
-              <a:pPr algn="ctr"/>
-              <a:r>
-                <a:rPr lang="en-US" sz="3200" dirty="0" smtClean="0"/>
-                <a:t>4x</a:t>
-              </a:r>
-              <a:endParaRPr lang="en-US" sz="3200" dirty="0"/>
-            </a:p>
-          </p:txBody>
-        </p:sp>
-        <p:sp>
-          <p:nvSpPr>
-            <p:cNvPr id="48" name="TextBox 47"/>
-            <p:cNvSpPr txBox="1"/>
-            <p:nvPr/>
-          </p:nvSpPr>
-          <p:spPr>
-            <a:xfrm>
-              <a:off x="3810000" y="17068800"/>
-              <a:ext cx="1295400" cy="442227"/>
-            </a:xfrm>
-            <a:prstGeom prst="rect">
-              <a:avLst/>
-            </a:prstGeom>
-            <a:noFill/>
-          </p:spPr>
-          <p:txBody>
-            <a:bodyPr wrap="square" rtlCol="0">
-              <a:spAutoFit/>
-            </a:bodyPr>
-            <a:lstStyle/>
-            <a:p>
-              <a:r>
-                <a:rPr lang="en-US" sz="2000" b="1" dirty="0" smtClean="0"/>
-                <a:t>Insert</a:t>
-              </a:r>
-              <a:endParaRPr lang="en-US" sz="2000" b="1" dirty="0"/>
-            </a:p>
-          </p:txBody>
-        </p:sp>
-        <p:sp>
-          <p:nvSpPr>
-            <p:cNvPr id="49" name="TextBox 48"/>
-            <p:cNvSpPr txBox="1"/>
-            <p:nvPr/>
-          </p:nvSpPr>
-          <p:spPr>
-            <a:xfrm>
-              <a:off x="6248400" y="18059400"/>
-              <a:ext cx="1066800" cy="442227"/>
-            </a:xfrm>
-            <a:prstGeom prst="rect">
-              <a:avLst/>
-            </a:prstGeom>
-            <a:noFill/>
-          </p:spPr>
-          <p:txBody>
-            <a:bodyPr wrap="square" rtlCol="0">
-              <a:spAutoFit/>
-            </a:bodyPr>
-            <a:lstStyle/>
-            <a:p>
-              <a:pPr algn="ctr"/>
-              <a:r>
-                <a:rPr lang="en-US" sz="2000" b="1" dirty="0" smtClean="0"/>
-                <a:t>LRU</a:t>
-              </a:r>
-              <a:endParaRPr lang="en-US" sz="2000" b="1" dirty="0"/>
-            </a:p>
-          </p:txBody>
-        </p:sp>
-        <p:sp>
-          <p:nvSpPr>
-            <p:cNvPr id="50" name="TextBox 49"/>
-            <p:cNvSpPr txBox="1"/>
-            <p:nvPr/>
-          </p:nvSpPr>
-          <p:spPr>
-            <a:xfrm>
-              <a:off x="5181600" y="16992600"/>
-              <a:ext cx="2057399" cy="646330"/>
-            </a:xfrm>
-            <a:prstGeom prst="rect">
-              <a:avLst/>
-            </a:prstGeom>
-          </p:spPr>
-          <p:style>
-            <a:lnRef idx="2">
-              <a:schemeClr val="accent2"/>
-            </a:lnRef>
-            <a:fillRef idx="1">
-              <a:schemeClr val="lt1"/>
-            </a:fillRef>
-            <a:effectRef idx="0">
-              <a:schemeClr val="accent2"/>
-            </a:effectRef>
-            <a:fontRef idx="minor">
-              <a:schemeClr val="dk1"/>
-            </a:fontRef>
-          </p:style>
-          <p:txBody>
-            <a:bodyPr wrap="square" rtlCol="0">
-              <a:spAutoFit/>
-            </a:bodyPr>
-            <a:lstStyle/>
-            <a:p>
-              <a:pPr algn="ctr"/>
-              <a:r>
-                <a:rPr lang="en-US" sz="3200" dirty="0" smtClean="0"/>
-                <a:t>4x</a:t>
-              </a:r>
-              <a:endParaRPr lang="en-US" sz="3200" dirty="0"/>
-            </a:p>
-          </p:txBody>
-        </p:sp>
-        <p:sp>
-          <p:nvSpPr>
-            <p:cNvPr id="51" name="Rectangle 50"/>
-            <p:cNvSpPr/>
-            <p:nvPr/>
-          </p:nvSpPr>
-          <p:spPr>
-            <a:xfrm>
-              <a:off x="685800" y="19659600"/>
-              <a:ext cx="6553200" cy="914400"/>
-            </a:xfrm>
-            <a:prstGeom prst="rect">
-              <a:avLst/>
-            </a:prstGeom>
-          </p:spPr>
-          <p:style>
-            <a:lnRef idx="1">
-              <a:schemeClr val="dk1"/>
-            </a:lnRef>
-            <a:fillRef idx="2">
-              <a:schemeClr val="dk1"/>
-            </a:fillRef>
-            <a:effectRef idx="1">
-              <a:schemeClr val="dk1"/>
-            </a:effectRef>
-            <a:fontRef idx="minor">
-              <a:schemeClr val="dk1"/>
-            </a:fontRef>
-          </p:style>
-          <p:txBody>
-            <a:bodyPr rtlCol="0" anchor="ctr"/>
-            <a:lstStyle/>
-            <a:p>
-              <a:pPr algn="ctr"/>
-              <a:endParaRPr lang="en-US" sz="6000"/>
-            </a:p>
-          </p:txBody>
-        </p:sp>
-        <p:sp>
-          <p:nvSpPr>
-            <p:cNvPr id="52" name="TextBox 51"/>
-            <p:cNvSpPr txBox="1"/>
-            <p:nvPr/>
-          </p:nvSpPr>
-          <p:spPr>
-            <a:xfrm>
-              <a:off x="838201" y="19888200"/>
-              <a:ext cx="1143000" cy="442227"/>
-            </a:xfrm>
-            <a:prstGeom prst="rect">
-              <a:avLst/>
-            </a:prstGeom>
-            <a:noFill/>
-          </p:spPr>
-          <p:txBody>
-            <a:bodyPr wrap="square" rtlCol="0">
-              <a:spAutoFit/>
-            </a:bodyPr>
-            <a:lstStyle/>
-            <a:p>
-              <a:r>
-                <a:rPr lang="en-US" sz="2000" b="1" dirty="0" smtClean="0"/>
-                <a:t>Set 0</a:t>
-              </a:r>
-              <a:endParaRPr lang="en-US" sz="2000" b="1" dirty="0"/>
-            </a:p>
-          </p:txBody>
-        </p:sp>
-        <p:sp>
-          <p:nvSpPr>
-            <p:cNvPr id="53" name="Rectangle 52"/>
-            <p:cNvSpPr/>
-            <p:nvPr/>
-          </p:nvSpPr>
-          <p:spPr>
-            <a:xfrm>
-              <a:off x="685800" y="20878800"/>
-              <a:ext cx="6553200" cy="914400"/>
-            </a:xfrm>
-            <a:prstGeom prst="rect">
-              <a:avLst/>
-            </a:prstGeom>
-          </p:spPr>
-          <p:style>
-            <a:lnRef idx="1">
-              <a:schemeClr val="dk1"/>
-            </a:lnRef>
-            <a:fillRef idx="2">
-              <a:schemeClr val="dk1"/>
-            </a:fillRef>
-            <a:effectRef idx="1">
-              <a:schemeClr val="dk1"/>
-            </a:effectRef>
-            <a:fontRef idx="minor">
-              <a:schemeClr val="dk1"/>
-            </a:fontRef>
-          </p:style>
-          <p:txBody>
-            <a:bodyPr rtlCol="0" anchor="ctr"/>
-            <a:lstStyle/>
-            <a:p>
-              <a:pPr algn="ctr"/>
-              <a:endParaRPr lang="en-US" sz="6000"/>
-            </a:p>
-          </p:txBody>
-        </p:sp>
-        <p:sp>
-          <p:nvSpPr>
-            <p:cNvPr id="54" name="TextBox 53"/>
-            <p:cNvSpPr txBox="1"/>
-            <p:nvPr/>
-          </p:nvSpPr>
-          <p:spPr>
-            <a:xfrm>
-              <a:off x="838201" y="21107400"/>
-              <a:ext cx="1143000" cy="442227"/>
-            </a:xfrm>
-            <a:prstGeom prst="rect">
-              <a:avLst/>
-            </a:prstGeom>
-            <a:noFill/>
-          </p:spPr>
-          <p:txBody>
-            <a:bodyPr wrap="square" rtlCol="0">
-              <a:spAutoFit/>
-            </a:bodyPr>
-            <a:lstStyle/>
-            <a:p>
-              <a:r>
-                <a:rPr lang="en-US" sz="2000" b="1" dirty="0" smtClean="0"/>
-                <a:t>Set 0</a:t>
-              </a:r>
-              <a:endParaRPr lang="en-US" sz="2000" b="1" dirty="0"/>
-            </a:p>
-          </p:txBody>
-        </p:sp>
-        <p:sp>
-          <p:nvSpPr>
-            <p:cNvPr id="55" name="TextBox 54"/>
-            <p:cNvSpPr txBox="1"/>
-            <p:nvPr/>
-          </p:nvSpPr>
-          <p:spPr>
-            <a:xfrm>
-              <a:off x="1828800" y="20955000"/>
-              <a:ext cx="2057399" cy="646330"/>
-            </a:xfrm>
-            <a:prstGeom prst="rect">
-              <a:avLst/>
-            </a:prstGeom>
-          </p:spPr>
-          <p:style>
-            <a:lnRef idx="2">
-              <a:schemeClr val="accent2"/>
-            </a:lnRef>
-            <a:fillRef idx="1">
-              <a:schemeClr val="lt1"/>
-            </a:fillRef>
-            <a:effectRef idx="0">
-              <a:schemeClr val="accent2"/>
-            </a:effectRef>
-            <a:fontRef idx="minor">
-              <a:schemeClr val="dk1"/>
-            </a:fontRef>
-          </p:style>
-          <p:txBody>
-            <a:bodyPr wrap="square" rtlCol="0">
-              <a:spAutoFit/>
-            </a:bodyPr>
-            <a:lstStyle/>
-            <a:p>
-              <a:pPr algn="ctr"/>
-              <a:r>
-                <a:rPr lang="en-US" sz="3200" dirty="0" smtClean="0"/>
-                <a:t>4x</a:t>
-              </a:r>
-              <a:endParaRPr lang="en-US" sz="3200" dirty="0"/>
-            </a:p>
-          </p:txBody>
-        </p:sp>
-      </p:grpSp>
       <p:grpSp>
         <p:nvGrpSpPr>
           <p:cNvPr id="104" name="Group 103"/>
@@ -7126,9 +6152,59 @@
           </p:xfrm>
           <a:graphic>
             <a:graphicData uri="http://schemas.openxmlformats.org/presentationml/2006/ole">
-              <p:oleObj spid="_x0000_s1027" name="Equation" r:id="rId7" imgW="114120" imgH="215640" progId="Equation.3">
-                <p:embed/>
-              </p:oleObj>
+              <mc:AlternateContent xmlns:mc="http://schemas.openxmlformats.org/markup-compatibility/2006">
+                <mc:Choice xmlns:v="urn:schemas-microsoft-com:vml" Requires="v">
+                  <p:oleObj spid="_x0000_s1038" name="Equation" r:id="rId6" imgW="114120" imgH="215640" progId="Equation.3">
+                    <p:embed/>
+                  </p:oleObj>
+                </mc:Choice>
+                <mc:Fallback>
+                  <p:oleObj name="Equation" r:id="rId6" imgW="114120" imgH="215640" progId="Equation.3">
+                    <p:embed/>
+                    <p:pic>
+                      <p:nvPicPr>
+                        <p:cNvPr id="0" name="Picture 3"/>
+                        <p:cNvPicPr>
+                          <a:picLocks noChangeAspect="1" noChangeArrowheads="1"/>
+                        </p:cNvPicPr>
+                        <p:nvPr/>
+                      </p:nvPicPr>
+                      <p:blipFill>
+                        <a:blip r:embed="rId7">
+                          <a:extLst>
+                            <a:ext uri="{28A0092B-C50C-407E-A947-70E740481C1C}">
+                              <a14:useLocalDpi xmlns:a14="http://schemas.microsoft.com/office/drawing/2010/main" val="0"/>
+                            </a:ext>
+                          </a:extLst>
+                        </a:blip>
+                        <a:srcRect/>
+                        <a:stretch>
+                          <a:fillRect/>
+                        </a:stretch>
+                      </p:blipFill>
+                      <p:spPr bwMode="auto">
+                        <a:xfrm>
+                          <a:off x="14725650" y="18364200"/>
+                          <a:ext cx="114300" cy="215900"/>
+                        </a:xfrm>
+                        <a:prstGeom prst="rect">
+                          <a:avLst/>
+                        </a:prstGeom>
+                        <a:noFill/>
+                        <a:extLst>
+                          <a:ext uri="{909E8E84-426E-40dd-AFC4-6F175D3DCCD1}">
+                            <a14:hiddenFill xmlns:a14="http://schemas.microsoft.com/office/drawing/2010/main">
+                              <a:solidFill>
+                                <a:srgbClr val="FFFFFF"/>
+                              </a:solidFill>
+                            </a14:hiddenFill>
+                          </a:ext>
+                        </a:extLst>
+                      </p:spPr>
+                    </p:pic>
+                  </p:oleObj>
+                </mc:Fallback>
+              </mc:AlternateContent>
             </a:graphicData>
           </a:graphic>
         </p:graphicFrame>
@@ -8687,11 +7763,7 @@
             </a:r>
             <a:r>
               <a:rPr lang="en-US" sz="3600" u="sng" dirty="0" smtClean="0"/>
-              <a:t>O</a:t>
-            </a:r>
-            <a:r>
-              <a:rPr lang="en-US" sz="3600" u="sng" dirty="0" smtClean="0"/>
-              <a:t>utperforms current state-of-the-art replacement policies</a:t>
+              <a:t>Outperforms current state-of-the-art replacement policies</a:t>
             </a:r>
           </a:p>
           <a:p>
@@ -9128,39 +8200,6 @@
       </p:sp>
       <p:sp>
         <p:nvSpPr>
-          <p:cNvPr id="113" name="TextBox 112"/>
-          <p:cNvSpPr txBox="1"/>
-          <p:nvPr/>
-        </p:nvSpPr>
-        <p:spPr>
-          <a:xfrm>
-            <a:off x="14249400" y="8763000"/>
-            <a:ext cx="2209800" cy="707886"/>
-          </a:xfrm>
-          <a:prstGeom prst="rect">
-            <a:avLst/>
-          </a:prstGeom>
-          <a:noFill/>
-        </p:spPr>
-        <p:txBody>
-          <a:bodyPr wrap="square" rtlCol="0">
-            <a:spAutoFit/>
-          </a:bodyPr>
-          <a:lstStyle/>
-          <a:p>
-            <a:r>
-              <a:rPr lang="en-US" sz="4000" dirty="0">
-                <a:solidFill>
-                  <a:srgbClr val="0000FF"/>
-                </a:solidFill>
-              </a:rPr>
-              <a:t>Example</a:t>
-            </a:r>
-          </a:p>
-        </p:txBody>
-      </p:sp>
-      <p:sp>
-        <p:nvSpPr>
           <p:cNvPr id="114" name="TextBox 113"/>
           <p:cNvSpPr txBox="1"/>
           <p:nvPr/>
@@ -9189,6 +8228,73 @@
           </a:p>
         </p:txBody>
       </p:sp>
+      <p:graphicFrame>
+        <p:nvGraphicFramePr>
+          <p:cNvPr id="115" name="Chart 114"/>
+          <p:cNvGraphicFramePr>
+            <a:graphicFrameLocks/>
+          </p:cNvGraphicFramePr>
+          <p:nvPr>
+            <p:extLst>
+              <p:ext uri="{D42A27DB-BD31-4B8C-83A1-F6EECF244321}">
+                <p14:modId xmlns:p14="http://schemas.microsoft.com/office/powerpoint/2010/main" val="2023913523"/>
+              </p:ext>
+            </p:extLst>
+          </p:nvPr>
+        </p:nvGraphicFramePr>
+        <p:xfrm>
+          <a:off x="14020800" y="9601200"/>
+          <a:ext cx="8458200" cy="5181600"/>
+        </p:xfrm>
+        <a:graphic>
+          <a:graphicData uri="http://schemas.openxmlformats.org/drawingml/2006/chart">
+            <c:chart xmlns:c="http://schemas.openxmlformats.org/drawingml/2006/chart" xmlns:r="http://schemas.openxmlformats.org/officeDocument/2006/relationships" r:id="rId10"/>
+          </a:graphicData>
+        </a:graphic>
+      </p:graphicFrame>
+      <p:sp>
+        <p:nvSpPr>
+          <p:cNvPr id="3" name="TextBox 2"/>
+          <p:cNvSpPr txBox="1"/>
+          <p:nvPr/>
+        </p:nvSpPr>
+        <p:spPr>
+          <a:xfrm>
+            <a:off x="22555200" y="10134600"/>
+            <a:ext cx="4267200" cy="3970318"/>
+          </a:xfrm>
+          <a:prstGeom prst="rect">
+            <a:avLst/>
+          </a:prstGeom>
+          <a:noFill/>
+        </p:spPr>
+        <p:txBody>
+          <a:bodyPr wrap="square" rtlCol="0">
+            <a:spAutoFit/>
+          </a:bodyPr>
+          <a:lstStyle/>
+          <a:p>
+            <a:r>
+              <a:rPr lang="en-US" sz="2800" b="1" dirty="0" smtClean="0"/>
+              <a:t>Figure 1. </a:t>
+            </a:r>
+            <a:r>
+              <a:rPr lang="en-US" sz="2800" dirty="0" smtClean="0"/>
+              <a:t>Each column shows the ratio block-types for B+D with and without splitting and pooling.</a:t>
+            </a:r>
+          </a:p>
+          <a:p>
+            <a:endParaRPr lang="en-US" sz="2800" dirty="0" smtClean="0"/>
+          </a:p>
+          <a:p>
+            <a:r>
+              <a:rPr lang="en-US" sz="2800" dirty="0" smtClean="0"/>
+              <a:t>Notice the large increase in 1-byte all-zero blocks, and general decrease of large, uncompressed blocks.</a:t>
+            </a:r>
+            <a:endParaRPr lang="en-US" sz="2800" dirty="0"/>
+          </a:p>
+        </p:txBody>
+      </p:sp>
     </p:spTree>
   </p:cSld>
   <p:clrMapOvr>
@@ -9197,7 +8303,7 @@
   <p:timing>
     <p:tnLst>
       <p:par>
-        <p:cTn id="1" dur="indefinite" restart="never" nodeType="tmRoot"/>
+        <p:cTn xmlns:p14="http://schemas.microsoft.com/office/powerpoint/2010/main" id="1" dur="indefinite" restart="never" nodeType="tmRoot"/>
       </p:par>
     </p:tnLst>
   </p:timing>

</xml_diff>